<commit_message>
Poster setup and fixed typos
</commit_message>
<xml_diff>
--- a/Poster/poster-template-ppt-A0.pptx
+++ b/Poster/poster-template-ppt-A0.pptx
@@ -6,7 +6,6 @@
   </p:sldMasterIdLst>
   <p:sldIdLst>
     <p:sldId id="256" r:id="rId2"/>
-    <p:sldId id="257" r:id="rId3"/>
   </p:sldIdLst>
   <p:sldSz cx="30275213" cy="42803763"/>
   <p:notesSz cx="6858000" cy="9144000"/>
@@ -105,6 +104,11 @@
       </a:defRPr>
     </a:lvl9pPr>
   </p:defaultTextStyle>
+  <p:extLst>
+    <p:ext uri="{EFAFB233-063F-42B5-8137-9DF3F51BA10A}">
+      <p15:sldGuideLst xmlns:p15="http://schemas.microsoft.com/office/powerpoint/2012/main"/>
+    </p:ext>
+  </p:extLst>
 </p:presentation>
 </file>
 
@@ -191,19 +195,19 @@
           </a:lstStyle>
           <a:p>
             <a:r>
-              <a:rPr lang="en-US" dirty="0" smtClean="0"/>
+              <a:rPr lang="en-US" dirty="0"/>
               <a:t>Name Surname</a:t>
             </a:r>
           </a:p>
           <a:p>
             <a:r>
-              <a:rPr lang="en-US" dirty="0" smtClean="0"/>
+              <a:rPr lang="en-US" dirty="0"/>
               <a:t>Function</a:t>
             </a:r>
           </a:p>
           <a:p>
             <a:r>
-              <a:rPr lang="en-US" dirty="0" smtClean="0"/>
+              <a:rPr lang="en-US" dirty="0"/>
               <a:t>Email</a:t>
             </a:r>
           </a:p>
@@ -358,21 +362,21 @@
           <a:p>
             <a:pPr lvl="0"/>
             <a:r>
-              <a:rPr lang="en-US" dirty="0" smtClean="0"/>
+              <a:rPr lang="en-US" dirty="0"/>
               <a:t>Name Surname</a:t>
             </a:r>
           </a:p>
           <a:p>
             <a:pPr lvl="0"/>
             <a:r>
-              <a:rPr lang="en-US" dirty="0" smtClean="0"/>
+              <a:rPr lang="en-US" dirty="0"/>
               <a:t>Function</a:t>
             </a:r>
           </a:p>
           <a:p>
             <a:pPr lvl="0"/>
             <a:r>
-              <a:rPr lang="en-US" dirty="0" smtClean="0"/>
+              <a:rPr lang="en-US" dirty="0"/>
               <a:t>Email</a:t>
             </a:r>
           </a:p>
@@ -445,21 +449,21 @@
           <a:p>
             <a:pPr lvl="0"/>
             <a:r>
-              <a:rPr lang="en-US" dirty="0" smtClean="0"/>
+              <a:rPr lang="en-US" dirty="0"/>
               <a:t>Name Surname</a:t>
             </a:r>
           </a:p>
           <a:p>
             <a:pPr lvl="0"/>
             <a:r>
-              <a:rPr lang="en-US" dirty="0" smtClean="0"/>
+              <a:rPr lang="en-US" dirty="0"/>
               <a:t>Function</a:t>
             </a:r>
           </a:p>
           <a:p>
             <a:pPr lvl="0"/>
             <a:r>
-              <a:rPr lang="en-US" dirty="0" smtClean="0"/>
+              <a:rPr lang="en-US" dirty="0"/>
               <a:t>Email</a:t>
             </a:r>
           </a:p>
@@ -563,10 +567,9 @@
           </a:lstStyle>
           <a:p>
             <a:r>
-              <a:rPr lang="en-US" dirty="0" smtClean="0"/>
+              <a:rPr lang="en-US" dirty="0"/>
               <a:t>Name Faculty or Institute</a:t>
             </a:r>
-            <a:endParaRPr lang="en-US" dirty="0"/>
           </a:p>
         </p:txBody>
       </p:sp>
@@ -628,7 +631,7 @@
           </a:lstStyle>
           <a:p>
             <a:r>
-              <a:rPr lang="en-US" smtClean="0"/>
+              <a:rPr lang="en-US"/>
               <a:t>Click to edit Master title style</a:t>
             </a:r>
             <a:endParaRPr lang="en-US" dirty="0"/>
@@ -693,7 +696,7 @@
           </a:lstStyle>
           <a:p>
             <a:r>
-              <a:rPr lang="en-US" smtClean="0"/>
+              <a:rPr lang="en-US"/>
               <a:t>Click icon to add picture</a:t>
             </a:r>
             <a:endParaRPr lang="en-US" dirty="0"/>
@@ -717,7 +720,7 @@
           <a:p>
             <a:fld id="{785D7E78-45B7-4E8E-A036-5E4E313147A1}" type="datetimeFigureOut">
               <a:rPr lang="it-CH" smtClean="0"/>
-              <a:t>04.07.2018</a:t>
+              <a:t>12.06.2025</a:t>
             </a:fld>
             <a:endParaRPr lang="it-CH"/>
           </a:p>
@@ -819,7 +822,7 @@
           <a:lstStyle/>
           <a:p>
             <a:r>
-              <a:rPr lang="en-US" smtClean="0"/>
+              <a:rPr lang="en-US"/>
               <a:t>Click to edit Master title style</a:t>
             </a:r>
             <a:endParaRPr lang="en-US" dirty="0"/>
@@ -843,35 +846,35 @@
           <a:p>
             <a:pPr lvl="0"/>
             <a:r>
-              <a:rPr lang="en-US" smtClean="0"/>
+              <a:rPr lang="en-US"/>
               <a:t>Edit Master text styles</a:t>
             </a:r>
           </a:p>
           <a:p>
             <a:pPr lvl="1"/>
             <a:r>
-              <a:rPr lang="en-US" smtClean="0"/>
+              <a:rPr lang="en-US"/>
               <a:t>Second level</a:t>
             </a:r>
           </a:p>
           <a:p>
             <a:pPr lvl="2"/>
             <a:r>
-              <a:rPr lang="en-US" smtClean="0"/>
+              <a:rPr lang="en-US"/>
               <a:t>Third level</a:t>
             </a:r>
           </a:p>
           <a:p>
             <a:pPr lvl="3"/>
             <a:r>
-              <a:rPr lang="en-US" smtClean="0"/>
+              <a:rPr lang="en-US"/>
               <a:t>Fourth level</a:t>
             </a:r>
           </a:p>
           <a:p>
             <a:pPr lvl="4"/>
             <a:r>
-              <a:rPr lang="en-US" smtClean="0"/>
+              <a:rPr lang="en-US"/>
               <a:t>Fifth level</a:t>
             </a:r>
             <a:endParaRPr lang="en-US" dirty="0"/>
@@ -895,7 +898,7 @@
           <a:p>
             <a:fld id="{785D7E78-45B7-4E8E-A036-5E4E313147A1}" type="datetimeFigureOut">
               <a:rPr lang="it-CH" smtClean="0"/>
-              <a:t>04.07.2018</a:t>
+              <a:t>12.06.2025</a:t>
             </a:fld>
             <a:endParaRPr lang="it-CH"/>
           </a:p>
@@ -997,7 +1000,7 @@
           <a:lstStyle/>
           <a:p>
             <a:r>
-              <a:rPr lang="en-US" smtClean="0"/>
+              <a:rPr lang="en-US"/>
               <a:t>Click to edit Master title style</a:t>
             </a:r>
             <a:endParaRPr lang="en-US" dirty="0"/>
@@ -1026,35 +1029,35 @@
           <a:p>
             <a:pPr lvl="0"/>
             <a:r>
-              <a:rPr lang="en-US" smtClean="0"/>
+              <a:rPr lang="en-US"/>
               <a:t>Edit Master text styles</a:t>
             </a:r>
           </a:p>
           <a:p>
             <a:pPr lvl="1"/>
             <a:r>
-              <a:rPr lang="en-US" smtClean="0"/>
+              <a:rPr lang="en-US"/>
               <a:t>Second level</a:t>
             </a:r>
           </a:p>
           <a:p>
             <a:pPr lvl="2"/>
             <a:r>
-              <a:rPr lang="en-US" smtClean="0"/>
+              <a:rPr lang="en-US"/>
               <a:t>Third level</a:t>
             </a:r>
           </a:p>
           <a:p>
             <a:pPr lvl="3"/>
             <a:r>
-              <a:rPr lang="en-US" smtClean="0"/>
+              <a:rPr lang="en-US"/>
               <a:t>Fourth level</a:t>
             </a:r>
           </a:p>
           <a:p>
             <a:pPr lvl="4"/>
             <a:r>
-              <a:rPr lang="en-US" smtClean="0"/>
+              <a:rPr lang="en-US"/>
               <a:t>Fifth level</a:t>
             </a:r>
             <a:endParaRPr lang="en-US" dirty="0"/>
@@ -1078,7 +1081,7 @@
           <a:p>
             <a:fld id="{785D7E78-45B7-4E8E-A036-5E4E313147A1}" type="datetimeFigureOut">
               <a:rPr lang="it-CH" smtClean="0"/>
-              <a:t>04.07.2018</a:t>
+              <a:t>12.06.2025</a:t>
             </a:fld>
             <a:endParaRPr lang="it-CH"/>
           </a:p>
@@ -1222,22 +1225,21 @@
           </a:lstStyle>
           <a:p>
             <a:r>
-              <a:rPr lang="en-US" dirty="0" smtClean="0"/>
+              <a:rPr lang="en-US" dirty="0"/>
               <a:t>Name Surname</a:t>
             </a:r>
           </a:p>
           <a:p>
             <a:r>
-              <a:rPr lang="en-US" dirty="0" smtClean="0"/>
+              <a:rPr lang="en-US" dirty="0"/>
               <a:t>Function</a:t>
             </a:r>
           </a:p>
           <a:p>
             <a:r>
-              <a:rPr lang="en-US" dirty="0" smtClean="0"/>
+              <a:rPr lang="en-US" dirty="0"/>
               <a:t>Email</a:t>
             </a:r>
-            <a:endParaRPr lang="en-US" dirty="0"/>
           </a:p>
         </p:txBody>
       </p:sp>
@@ -1390,21 +1392,21 @@
           <a:p>
             <a:pPr lvl="0"/>
             <a:r>
-              <a:rPr lang="en-US" dirty="0" smtClean="0"/>
+              <a:rPr lang="en-US" dirty="0"/>
               <a:t>Name Surname</a:t>
             </a:r>
           </a:p>
           <a:p>
             <a:pPr lvl="0"/>
             <a:r>
-              <a:rPr lang="en-US" dirty="0" smtClean="0"/>
+              <a:rPr lang="en-US" dirty="0"/>
               <a:t>Function</a:t>
             </a:r>
           </a:p>
           <a:p>
             <a:pPr lvl="0"/>
             <a:r>
-              <a:rPr lang="en-US" dirty="0" smtClean="0"/>
+              <a:rPr lang="en-US" dirty="0"/>
               <a:t>Email</a:t>
             </a:r>
           </a:p>
@@ -1477,21 +1479,21 @@
           <a:p>
             <a:pPr lvl="0"/>
             <a:r>
-              <a:rPr lang="en-US" dirty="0" smtClean="0"/>
+              <a:rPr lang="en-US" dirty="0"/>
               <a:t>Name Surname</a:t>
             </a:r>
           </a:p>
           <a:p>
             <a:pPr lvl="0"/>
             <a:r>
-              <a:rPr lang="en-US" dirty="0" smtClean="0"/>
+              <a:rPr lang="en-US" dirty="0"/>
               <a:t>Function</a:t>
             </a:r>
           </a:p>
           <a:p>
             <a:pPr lvl="0"/>
             <a:r>
-              <a:rPr lang="en-US" dirty="0" smtClean="0"/>
+              <a:rPr lang="en-US" dirty="0"/>
               <a:t>Email</a:t>
             </a:r>
           </a:p>
@@ -1595,10 +1597,9 @@
           </a:lstStyle>
           <a:p>
             <a:r>
-              <a:rPr lang="en-US" dirty="0" smtClean="0"/>
+              <a:rPr lang="en-US" dirty="0"/>
               <a:t>Name Faculty or Institute</a:t>
             </a:r>
-            <a:endParaRPr lang="en-US" dirty="0"/>
           </a:p>
         </p:txBody>
       </p:sp>
@@ -1656,7 +1657,7 @@
           <a:lstStyle/>
           <a:p>
             <a:r>
-              <a:rPr lang="en-US" smtClean="0"/>
+              <a:rPr lang="en-US"/>
               <a:t>Click to edit Master title style</a:t>
             </a:r>
             <a:endParaRPr lang="en-US" dirty="0"/>
@@ -1680,35 +1681,35 @@
           <a:p>
             <a:pPr lvl="0"/>
             <a:r>
-              <a:rPr lang="en-US" smtClean="0"/>
+              <a:rPr lang="en-US"/>
               <a:t>Edit Master text styles</a:t>
             </a:r>
           </a:p>
           <a:p>
             <a:pPr lvl="1"/>
             <a:r>
-              <a:rPr lang="en-US" smtClean="0"/>
+              <a:rPr lang="en-US"/>
               <a:t>Second level</a:t>
             </a:r>
           </a:p>
           <a:p>
             <a:pPr lvl="2"/>
             <a:r>
-              <a:rPr lang="en-US" smtClean="0"/>
+              <a:rPr lang="en-US"/>
               <a:t>Third level</a:t>
             </a:r>
           </a:p>
           <a:p>
             <a:pPr lvl="3"/>
             <a:r>
-              <a:rPr lang="en-US" smtClean="0"/>
+              <a:rPr lang="en-US"/>
               <a:t>Fourth level</a:t>
             </a:r>
           </a:p>
           <a:p>
             <a:pPr lvl="4"/>
             <a:r>
-              <a:rPr lang="en-US" smtClean="0"/>
+              <a:rPr lang="en-US"/>
               <a:t>Fifth level</a:t>
             </a:r>
             <a:endParaRPr lang="en-US" dirty="0"/>
@@ -1732,7 +1733,7 @@
           <a:p>
             <a:fld id="{785D7E78-45B7-4E8E-A036-5E4E313147A1}" type="datetimeFigureOut">
               <a:rPr lang="it-CH" smtClean="0"/>
-              <a:t>04.07.2018</a:t>
+              <a:t>12.06.2025</a:t>
             </a:fld>
             <a:endParaRPr lang="it-CH"/>
           </a:p>
@@ -1838,7 +1839,7 @@
           </a:lstStyle>
           <a:p>
             <a:r>
-              <a:rPr lang="en-US" smtClean="0"/>
+              <a:rPr lang="en-US"/>
               <a:t>Click to edit Master title style</a:t>
             </a:r>
             <a:endParaRPr lang="en-US" dirty="0"/>
@@ -1862,7 +1863,7 @@
           <a:p>
             <a:fld id="{785D7E78-45B7-4E8E-A036-5E4E313147A1}" type="datetimeFigureOut">
               <a:rPr lang="it-CH" smtClean="0"/>
-              <a:t>04.07.2018</a:t>
+              <a:t>12.06.2025</a:t>
             </a:fld>
             <a:endParaRPr lang="it-CH"/>
           </a:p>
@@ -1964,7 +1965,7 @@
           <a:lstStyle/>
           <a:p>
             <a:r>
-              <a:rPr lang="en-US" smtClean="0"/>
+              <a:rPr lang="en-US"/>
               <a:t>Click to edit Master title style</a:t>
             </a:r>
             <a:endParaRPr lang="en-US" dirty="0"/>
@@ -1993,35 +1994,35 @@
           <a:p>
             <a:pPr lvl="0"/>
             <a:r>
-              <a:rPr lang="en-US" smtClean="0"/>
+              <a:rPr lang="en-US"/>
               <a:t>Edit Master text styles</a:t>
             </a:r>
           </a:p>
           <a:p>
             <a:pPr lvl="1"/>
             <a:r>
-              <a:rPr lang="en-US" smtClean="0"/>
+              <a:rPr lang="en-US"/>
               <a:t>Second level</a:t>
             </a:r>
           </a:p>
           <a:p>
             <a:pPr lvl="2"/>
             <a:r>
-              <a:rPr lang="en-US" smtClean="0"/>
+              <a:rPr lang="en-US"/>
               <a:t>Third level</a:t>
             </a:r>
           </a:p>
           <a:p>
             <a:pPr lvl="3"/>
             <a:r>
-              <a:rPr lang="en-US" smtClean="0"/>
+              <a:rPr lang="en-US"/>
               <a:t>Fourth level</a:t>
             </a:r>
           </a:p>
           <a:p>
             <a:pPr lvl="4"/>
             <a:r>
-              <a:rPr lang="en-US" smtClean="0"/>
+              <a:rPr lang="en-US"/>
               <a:t>Fifth level</a:t>
             </a:r>
             <a:endParaRPr lang="en-US" dirty="0"/>
@@ -2050,35 +2051,35 @@
           <a:p>
             <a:pPr lvl="0"/>
             <a:r>
-              <a:rPr lang="en-US" smtClean="0"/>
+              <a:rPr lang="en-US"/>
               <a:t>Edit Master text styles</a:t>
             </a:r>
           </a:p>
           <a:p>
             <a:pPr lvl="1"/>
             <a:r>
-              <a:rPr lang="en-US" smtClean="0"/>
+              <a:rPr lang="en-US"/>
               <a:t>Second level</a:t>
             </a:r>
           </a:p>
           <a:p>
             <a:pPr lvl="2"/>
             <a:r>
-              <a:rPr lang="en-US" smtClean="0"/>
+              <a:rPr lang="en-US"/>
               <a:t>Third level</a:t>
             </a:r>
           </a:p>
           <a:p>
             <a:pPr lvl="3"/>
             <a:r>
-              <a:rPr lang="en-US" smtClean="0"/>
+              <a:rPr lang="en-US"/>
               <a:t>Fourth level</a:t>
             </a:r>
           </a:p>
           <a:p>
             <a:pPr lvl="4"/>
             <a:r>
-              <a:rPr lang="en-US" smtClean="0"/>
+              <a:rPr lang="en-US"/>
               <a:t>Fifth level</a:t>
             </a:r>
             <a:endParaRPr lang="en-US" dirty="0"/>
@@ -2102,7 +2103,7 @@
           <a:p>
             <a:fld id="{785D7E78-45B7-4E8E-A036-5E4E313147A1}" type="datetimeFigureOut">
               <a:rPr lang="it-CH" smtClean="0"/>
-              <a:t>04.07.2018</a:t>
+              <a:t>12.06.2025</a:t>
             </a:fld>
             <a:endParaRPr lang="it-CH"/>
           </a:p>
@@ -2204,7 +2205,7 @@
           <a:lstStyle/>
           <a:p>
             <a:r>
-              <a:rPr lang="en-US" smtClean="0"/>
+              <a:rPr lang="en-US"/>
               <a:t>Click to edit Master title style</a:t>
             </a:r>
             <a:endParaRPr lang="en-US" dirty="0"/>
@@ -2270,7 +2271,7 @@
           <a:p>
             <a:pPr lvl="0"/>
             <a:r>
-              <a:rPr lang="en-US" smtClean="0"/>
+              <a:rPr lang="en-US"/>
               <a:t>Edit Master text styles</a:t>
             </a:r>
           </a:p>
@@ -2298,35 +2299,35 @@
           <a:p>
             <a:pPr lvl="0"/>
             <a:r>
-              <a:rPr lang="en-US" smtClean="0"/>
+              <a:rPr lang="en-US"/>
               <a:t>Edit Master text styles</a:t>
             </a:r>
           </a:p>
           <a:p>
             <a:pPr lvl="1"/>
             <a:r>
-              <a:rPr lang="en-US" smtClean="0"/>
+              <a:rPr lang="en-US"/>
               <a:t>Second level</a:t>
             </a:r>
           </a:p>
           <a:p>
             <a:pPr lvl="2"/>
             <a:r>
-              <a:rPr lang="en-US" smtClean="0"/>
+              <a:rPr lang="en-US"/>
               <a:t>Third level</a:t>
             </a:r>
           </a:p>
           <a:p>
             <a:pPr lvl="3"/>
             <a:r>
-              <a:rPr lang="en-US" smtClean="0"/>
+              <a:rPr lang="en-US"/>
               <a:t>Fourth level</a:t>
             </a:r>
           </a:p>
           <a:p>
             <a:pPr lvl="4"/>
             <a:r>
-              <a:rPr lang="en-US" smtClean="0"/>
+              <a:rPr lang="en-US"/>
               <a:t>Fifth level</a:t>
             </a:r>
             <a:endParaRPr lang="en-US" dirty="0"/>
@@ -2392,7 +2393,7 @@
           <a:p>
             <a:pPr lvl="0"/>
             <a:r>
-              <a:rPr lang="en-US" smtClean="0"/>
+              <a:rPr lang="en-US"/>
               <a:t>Edit Master text styles</a:t>
             </a:r>
           </a:p>
@@ -2420,35 +2421,35 @@
           <a:p>
             <a:pPr lvl="0"/>
             <a:r>
-              <a:rPr lang="en-US" smtClean="0"/>
+              <a:rPr lang="en-US"/>
               <a:t>Edit Master text styles</a:t>
             </a:r>
           </a:p>
           <a:p>
             <a:pPr lvl="1"/>
             <a:r>
-              <a:rPr lang="en-US" smtClean="0"/>
+              <a:rPr lang="en-US"/>
               <a:t>Second level</a:t>
             </a:r>
           </a:p>
           <a:p>
             <a:pPr lvl="2"/>
             <a:r>
-              <a:rPr lang="en-US" smtClean="0"/>
+              <a:rPr lang="en-US"/>
               <a:t>Third level</a:t>
             </a:r>
           </a:p>
           <a:p>
             <a:pPr lvl="3"/>
             <a:r>
-              <a:rPr lang="en-US" smtClean="0"/>
+              <a:rPr lang="en-US"/>
               <a:t>Fourth level</a:t>
             </a:r>
           </a:p>
           <a:p>
             <a:pPr lvl="4"/>
             <a:r>
-              <a:rPr lang="en-US" smtClean="0"/>
+              <a:rPr lang="en-US"/>
               <a:t>Fifth level</a:t>
             </a:r>
             <a:endParaRPr lang="en-US" dirty="0"/>
@@ -2472,7 +2473,7 @@
           <a:p>
             <a:fld id="{785D7E78-45B7-4E8E-A036-5E4E313147A1}" type="datetimeFigureOut">
               <a:rPr lang="it-CH" smtClean="0"/>
-              <a:t>04.07.2018</a:t>
+              <a:t>12.06.2025</a:t>
             </a:fld>
             <a:endParaRPr lang="it-CH"/>
           </a:p>
@@ -2574,7 +2575,7 @@
           <a:lstStyle/>
           <a:p>
             <a:r>
-              <a:rPr lang="en-US" smtClean="0"/>
+              <a:rPr lang="en-US"/>
               <a:t>Click to edit Master title style</a:t>
             </a:r>
             <a:endParaRPr lang="en-US" dirty="0"/>
@@ -2598,7 +2599,7 @@
           <a:p>
             <a:fld id="{785D7E78-45B7-4E8E-A036-5E4E313147A1}" type="datetimeFigureOut">
               <a:rPr lang="it-CH" smtClean="0"/>
-              <a:t>04.07.2018</a:t>
+              <a:t>12.06.2025</a:t>
             </a:fld>
             <a:endParaRPr lang="it-CH"/>
           </a:p>
@@ -2693,7 +2694,7 @@
           <a:p>
             <a:fld id="{785D7E78-45B7-4E8E-A036-5E4E313147A1}" type="datetimeFigureOut">
               <a:rPr lang="it-CH" smtClean="0"/>
-              <a:t>04.07.2018</a:t>
+              <a:t>12.06.2025</a:t>
             </a:fld>
             <a:endParaRPr lang="it-CH"/>
           </a:p>
@@ -2799,10 +2800,9 @@
           </a:lstStyle>
           <a:p>
             <a:r>
-              <a:rPr lang="en-US" dirty="0" smtClean="0"/>
+              <a:rPr lang="en-US" dirty="0"/>
               <a:t>Click to edit Master title style</a:t>
             </a:r>
-            <a:endParaRPr lang="en-US" dirty="0"/>
           </a:p>
         </p:txBody>
       </p:sp>
@@ -2856,35 +2856,35 @@
           <a:p>
             <a:pPr lvl="0"/>
             <a:r>
-              <a:rPr lang="en-US" smtClean="0"/>
+              <a:rPr lang="en-US"/>
               <a:t>Edit Master text styles</a:t>
             </a:r>
           </a:p>
           <a:p>
             <a:pPr lvl="1"/>
             <a:r>
-              <a:rPr lang="en-US" smtClean="0"/>
+              <a:rPr lang="en-US"/>
               <a:t>Second level</a:t>
             </a:r>
           </a:p>
           <a:p>
             <a:pPr lvl="2"/>
             <a:r>
-              <a:rPr lang="en-US" smtClean="0"/>
+              <a:rPr lang="en-US"/>
               <a:t>Third level</a:t>
             </a:r>
           </a:p>
           <a:p>
             <a:pPr lvl="3"/>
             <a:r>
-              <a:rPr lang="en-US" smtClean="0"/>
+              <a:rPr lang="en-US"/>
               <a:t>Fourth level</a:t>
             </a:r>
           </a:p>
           <a:p>
             <a:pPr lvl="4"/>
             <a:r>
-              <a:rPr lang="en-US" smtClean="0"/>
+              <a:rPr lang="en-US"/>
               <a:t>Fifth level</a:t>
             </a:r>
             <a:endParaRPr lang="en-US" dirty="0"/>
@@ -2950,7 +2950,7 @@
           <a:p>
             <a:pPr lvl="0"/>
             <a:r>
-              <a:rPr lang="en-US" smtClean="0"/>
+              <a:rPr lang="en-US"/>
               <a:t>Edit Master text styles</a:t>
             </a:r>
           </a:p>
@@ -2973,7 +2973,7 @@
           <a:p>
             <a:fld id="{785D7E78-45B7-4E8E-A036-5E4E313147A1}" type="datetimeFigureOut">
               <a:rPr lang="it-CH" smtClean="0"/>
-              <a:t>04.07.2018</a:t>
+              <a:t>12.06.2025</a:t>
             </a:fld>
             <a:endParaRPr lang="it-CH"/>
           </a:p>
@@ -3083,38 +3083,37 @@
           <a:p>
             <a:pPr lvl="0"/>
             <a:r>
-              <a:rPr lang="en-US" dirty="0" smtClean="0"/>
+              <a:rPr lang="en-US" dirty="0"/>
               <a:t>Edit Master text styles</a:t>
             </a:r>
           </a:p>
           <a:p>
             <a:pPr lvl="1"/>
             <a:r>
-              <a:rPr lang="en-US" dirty="0" smtClean="0"/>
+              <a:rPr lang="en-US" dirty="0"/>
               <a:t>Second level</a:t>
             </a:r>
           </a:p>
           <a:p>
             <a:pPr lvl="2"/>
             <a:r>
-              <a:rPr lang="en-US" dirty="0" smtClean="0"/>
+              <a:rPr lang="en-US" dirty="0"/>
               <a:t>Third level</a:t>
             </a:r>
           </a:p>
           <a:p>
             <a:pPr lvl="3"/>
             <a:r>
-              <a:rPr lang="en-US" dirty="0" smtClean="0"/>
+              <a:rPr lang="en-US" dirty="0"/>
               <a:t>Fourth level</a:t>
             </a:r>
           </a:p>
           <a:p>
             <a:pPr lvl="4"/>
             <a:r>
-              <a:rPr lang="en-US" dirty="0" smtClean="0"/>
+              <a:rPr lang="en-US" dirty="0"/>
               <a:t>Fifth level</a:t>
             </a:r>
-            <a:endParaRPr lang="en-US" dirty="0"/>
           </a:p>
         </p:txBody>
       </p:sp>
@@ -3153,7 +3152,7 @@
           <a:p>
             <a:fld id="{785D7E78-45B7-4E8E-A036-5E4E313147A1}" type="datetimeFigureOut">
               <a:rPr lang="it-CH" smtClean="0"/>
-              <a:t>04.07.2018</a:t>
+              <a:t>12.06.2025</a:t>
             </a:fld>
             <a:endParaRPr lang="it-CH"/>
           </a:p>
@@ -3559,6 +3558,42 @@
           <a:chExt cx="0" cy="0"/>
         </a:xfrm>
       </p:grpSpPr>
+      <p:pic>
+        <p:nvPicPr>
+          <p:cNvPr id="15" name="Picture 14" descr="A screenshot of a video game&#10;&#10;AI-generated content may be incorrect.">
+            <a:extLst>
+              <a:ext uri="{FF2B5EF4-FFF2-40B4-BE49-F238E27FC236}">
+                <a16:creationId xmlns:a16="http://schemas.microsoft.com/office/drawing/2014/main" id="{55FBB38B-6C41-D043-2D1F-923A4D6256CA}"/>
+              </a:ext>
+            </a:extLst>
+          </p:cNvPr>
+          <p:cNvPicPr>
+            <a:picLocks noChangeAspect="1"/>
+          </p:cNvPicPr>
+          <p:nvPr/>
+        </p:nvPicPr>
+        <p:blipFill>
+          <a:blip r:embed="rId2">
+            <a:extLst>
+              <a:ext uri="{28A0092B-C50C-407E-A947-70E740481C1C}">
+                <a14:useLocalDpi xmlns:a14="http://schemas.microsoft.com/office/drawing/2010/main" val="0"/>
+              </a:ext>
+            </a:extLst>
+          </a:blip>
+          <a:stretch>
+            <a:fillRect/>
+          </a:stretch>
+        </p:blipFill>
+        <p:spPr>
+          <a:xfrm>
+            <a:off x="12739011" y="921429"/>
+            <a:ext cx="18487028" cy="23924389"/>
+          </a:xfrm>
+          <a:prstGeom prst="rect">
+            <a:avLst/>
+          </a:prstGeom>
+        </p:spPr>
+      </p:pic>
       <p:sp>
         <p:nvSpPr>
           <p:cNvPr id="2" name="Subtitle 1"/>
@@ -3569,69 +3604,1674 @@
             <p:ph type="subTitle" idx="1"/>
           </p:nvPr>
         </p:nvSpPr>
-        <p:spPr/>
+        <p:spPr>
+          <a:xfrm>
+            <a:off x="10799998" y="2237574"/>
+            <a:ext cx="5580000" cy="1333675"/>
+          </a:xfrm>
+        </p:spPr>
+        <p:txBody>
+          <a:bodyPr>
+            <a:normAutofit/>
+          </a:bodyPr>
+          <a:lstStyle/>
+          <a:p>
+            <a:pPr>
+              <a:lnSpc>
+                <a:spcPct val="100000"/>
+              </a:lnSpc>
+            </a:pPr>
+            <a:r>
+              <a:rPr lang="en-CH" sz="4000" b="1" dirty="0"/>
+              <a:t>Student: </a:t>
+            </a:r>
+          </a:p>
+          <a:p>
+            <a:pPr>
+              <a:lnSpc>
+                <a:spcPct val="100000"/>
+              </a:lnSpc>
+            </a:pPr>
+            <a:r>
+              <a:rPr lang="en-CH" sz="4000" b="1" dirty="0"/>
+              <a:t>Sasha Toscano</a:t>
+            </a:r>
+            <a:endParaRPr lang="it-CH" sz="4000" b="1" dirty="0"/>
+          </a:p>
+        </p:txBody>
+      </p:sp>
+      <p:sp>
+        <p:nvSpPr>
+          <p:cNvPr id="3" name="Text Placeholder 2"/>
+          <p:cNvSpPr>
+            <a:spLocks noGrp="1"/>
+          </p:cNvSpPr>
+          <p:nvPr>
+            <p:ph type="body" idx="13"/>
+          </p:nvPr>
+        </p:nvSpPr>
+        <p:spPr>
+          <a:xfrm>
+            <a:off x="16971457" y="2237574"/>
+            <a:ext cx="5580000" cy="1333675"/>
+          </a:xfrm>
+        </p:spPr>
+        <p:txBody>
+          <a:bodyPr>
+            <a:normAutofit/>
+          </a:bodyPr>
+          <a:lstStyle/>
+          <a:p>
+            <a:pPr>
+              <a:lnSpc>
+                <a:spcPct val="100000"/>
+              </a:lnSpc>
+            </a:pPr>
+            <a:r>
+              <a:rPr lang="en-CH" sz="4000" dirty="0"/>
+              <a:t>Advisor: </a:t>
+            </a:r>
+          </a:p>
+          <a:p>
+            <a:pPr>
+              <a:lnSpc>
+                <a:spcPct val="100000"/>
+              </a:lnSpc>
+            </a:pPr>
+            <a:r>
+              <a:rPr lang="en-CH" sz="4000" dirty="0"/>
+              <a:t>Carlo Alberto Furia</a:t>
+            </a:r>
+            <a:endParaRPr lang="it-CH" sz="4000" dirty="0"/>
+          </a:p>
+        </p:txBody>
+      </p:sp>
+      <p:sp>
+        <p:nvSpPr>
+          <p:cNvPr id="4" name="Text Placeholder 3"/>
+          <p:cNvSpPr>
+            <a:spLocks noGrp="1"/>
+          </p:cNvSpPr>
+          <p:nvPr>
+            <p:ph type="body" sz="half" idx="2"/>
+          </p:nvPr>
+        </p:nvSpPr>
+        <p:spPr>
+          <a:xfrm>
+            <a:off x="23142917" y="2237574"/>
+            <a:ext cx="5580000" cy="1333675"/>
+          </a:xfrm>
+        </p:spPr>
+        <p:txBody>
+          <a:bodyPr>
+            <a:normAutofit/>
+          </a:bodyPr>
+          <a:lstStyle/>
+          <a:p>
+            <a:pPr>
+              <a:lnSpc>
+                <a:spcPct val="100000"/>
+              </a:lnSpc>
+            </a:pPr>
+            <a:r>
+              <a:rPr lang="en-CH" sz="4000" dirty="0"/>
+              <a:t>Co-Advisor: </a:t>
+            </a:r>
+          </a:p>
+          <a:p>
+            <a:pPr>
+              <a:lnSpc>
+                <a:spcPct val="100000"/>
+              </a:lnSpc>
+            </a:pPr>
+            <a:r>
+              <a:rPr lang="en-CH" sz="4000" dirty="0"/>
+              <a:t>Marc </a:t>
+            </a:r>
+            <a:r>
+              <a:rPr lang="en-CH" sz="4000" dirty="0" err="1"/>
+              <a:t>Langheinrich</a:t>
+            </a:r>
+            <a:endParaRPr lang="it-CH" sz="4000" dirty="0"/>
+          </a:p>
+        </p:txBody>
+      </p:sp>
+      <p:sp>
+        <p:nvSpPr>
+          <p:cNvPr id="5" name="Title 4"/>
+          <p:cNvSpPr>
+            <a:spLocks noGrp="1"/>
+          </p:cNvSpPr>
+          <p:nvPr>
+            <p:ph type="title"/>
+          </p:nvPr>
+        </p:nvSpPr>
+        <p:spPr>
+          <a:xfrm>
+            <a:off x="10799998" y="295114"/>
+            <a:ext cx="17922919" cy="1138114"/>
+          </a:xfrm>
+        </p:spPr>
         <p:txBody>
           <a:bodyPr/>
           <a:lstStyle/>
           <a:p>
-            <a:endParaRPr lang="it-CH" dirty="0"/>
-          </a:p>
-        </p:txBody>
-      </p:sp>
-      <p:sp>
-        <p:nvSpPr>
-          <p:cNvPr id="3" name="Text Placeholder 2"/>
-          <p:cNvSpPr>
-            <a:spLocks noGrp="1"/>
-          </p:cNvSpPr>
-          <p:nvPr>
-            <p:ph type="body" idx="13"/>
-          </p:nvPr>
-        </p:nvSpPr>
-        <p:spPr/>
-        <p:txBody>
-          <a:bodyPr/>
-          <a:lstStyle/>
-          <a:p>
-            <a:endParaRPr lang="it-CH"/>
-          </a:p>
-        </p:txBody>
-      </p:sp>
-      <p:sp>
-        <p:nvSpPr>
-          <p:cNvPr id="4" name="Text Placeholder 3"/>
-          <p:cNvSpPr>
-            <a:spLocks noGrp="1"/>
-          </p:cNvSpPr>
-          <p:nvPr>
-            <p:ph type="body" sz="half" idx="2"/>
-          </p:nvPr>
-        </p:nvSpPr>
-        <p:spPr/>
-        <p:txBody>
-          <a:bodyPr/>
-          <a:lstStyle/>
-          <a:p>
-            <a:endParaRPr lang="it-CH"/>
-          </a:p>
-        </p:txBody>
-      </p:sp>
-      <p:sp>
-        <p:nvSpPr>
-          <p:cNvPr id="5" name="Title 4"/>
-          <p:cNvSpPr>
-            <a:spLocks noGrp="1"/>
-          </p:cNvSpPr>
-          <p:nvPr>
-            <p:ph type="title"/>
-          </p:nvPr>
-        </p:nvSpPr>
-        <p:spPr/>
-        <p:txBody>
-          <a:bodyPr/>
-          <a:lstStyle/>
-          <a:p>
-            <a:endParaRPr lang="it-CH"/>
+            <a:r>
+              <a:rPr lang="en-CH" dirty="0"/>
+              <a:t>Understanding Arbitrary Code Execution</a:t>
+            </a:r>
+            <a:br>
+              <a:rPr lang="en-CH" dirty="0"/>
+            </a:br>
+            <a:br>
+              <a:rPr lang="en-CH" sz="700" dirty="0"/>
+            </a:br>
+            <a:r>
+              <a:rPr lang="en-CH" sz="700" dirty="0"/>
+              <a:t> </a:t>
+            </a:r>
+            <a:r>
+              <a:rPr lang="en-CH" sz="3600" b="0" dirty="0"/>
+              <a:t>A case study on Pokémon Emerald</a:t>
+            </a:r>
+            <a:endParaRPr lang="it-CH" b="0" dirty="0"/>
+          </a:p>
+        </p:txBody>
+      </p:sp>
+      <p:pic>
+        <p:nvPicPr>
+          <p:cNvPr id="7" name="Picture 6" descr="A cartoon of a person with text&#10;&#10;AI-generated content may be incorrect.">
+            <a:extLst>
+              <a:ext uri="{FF2B5EF4-FFF2-40B4-BE49-F238E27FC236}">
+                <a16:creationId xmlns:a16="http://schemas.microsoft.com/office/drawing/2014/main" id="{1E9EA8C0-45E8-0618-AEBD-1D667EFFC2A5}"/>
+              </a:ext>
+            </a:extLst>
+          </p:cNvPr>
+          <p:cNvPicPr>
+            <a:picLocks noChangeAspect="1"/>
+          </p:cNvPicPr>
+          <p:nvPr/>
+        </p:nvPicPr>
+        <p:blipFill>
+          <a:blip r:embed="rId3">
+            <a:extLst>
+              <a:ext uri="{28A0092B-C50C-407E-A947-70E740481C1C}">
+                <a14:useLocalDpi xmlns:a14="http://schemas.microsoft.com/office/drawing/2010/main" val="0"/>
+              </a:ext>
+            </a:extLst>
+          </a:blip>
+          <a:stretch>
+            <a:fillRect/>
+          </a:stretch>
+        </p:blipFill>
+        <p:spPr>
+          <a:xfrm>
+            <a:off x="1275874" y="13079550"/>
+            <a:ext cx="11466605" cy="6661409"/>
+          </a:xfrm>
+          <a:prstGeom prst="rect">
+            <a:avLst/>
+          </a:prstGeom>
+        </p:spPr>
+      </p:pic>
+      <p:sp>
+        <p:nvSpPr>
+          <p:cNvPr id="8" name="TextBox 7">
+            <a:extLst>
+              <a:ext uri="{FF2B5EF4-FFF2-40B4-BE49-F238E27FC236}">
+                <a16:creationId xmlns:a16="http://schemas.microsoft.com/office/drawing/2014/main" id="{D3794370-13C7-1F97-003D-ECC6F3749BF7}"/>
+              </a:ext>
+            </a:extLst>
+          </p:cNvPr>
+          <p:cNvSpPr txBox="1"/>
+          <p:nvPr/>
+        </p:nvSpPr>
+        <p:spPr>
+          <a:xfrm>
+            <a:off x="1279341" y="6079230"/>
+            <a:ext cx="13858263" cy="4401205"/>
+          </a:xfrm>
+          <a:prstGeom prst="rect">
+            <a:avLst/>
+          </a:prstGeom>
+          <a:noFill/>
+        </p:spPr>
+        <p:txBody>
+          <a:bodyPr wrap="square" rtlCol="0">
+            <a:spAutoFit/>
+          </a:bodyPr>
+          <a:lstStyle/>
+          <a:p>
+            <a:r>
+              <a:rPr lang="en-US" sz="4000" dirty="0">
+                <a:latin typeface="Arial" panose="020B0604020202020204" pitchFamily="34" charset="0"/>
+                <a:cs typeface="Arial" panose="020B0604020202020204" pitchFamily="34" charset="0"/>
+              </a:rPr>
+              <a:t>This project analyzes a real-world ACE exploit in </a:t>
+            </a:r>
+            <a:r>
+              <a:rPr lang="en-US" sz="4000" i="1" dirty="0">
+                <a:latin typeface="Arial" panose="020B0604020202020204" pitchFamily="34" charset="0"/>
+                <a:cs typeface="Arial" panose="020B0604020202020204" pitchFamily="34" charset="0"/>
+              </a:rPr>
+              <a:t>Pokémon Emerald</a:t>
+            </a:r>
+            <a:r>
+              <a:rPr lang="en-US" sz="4000" dirty="0">
+                <a:latin typeface="Arial" panose="020B0604020202020204" pitchFamily="34" charset="0"/>
+                <a:cs typeface="Arial" panose="020B0604020202020204" pitchFamily="34" charset="0"/>
+              </a:rPr>
+              <a:t>, where in-game glitches are chained to manipulate memory and execute crafted instructions on original hardware</a:t>
+            </a:r>
+            <a:r>
+              <a:rPr lang="en-CH" sz="4000" dirty="0">
+                <a:latin typeface="Arial" panose="020B0604020202020204" pitchFamily="34" charset="0"/>
+                <a:cs typeface="Arial" panose="020B0604020202020204" pitchFamily="34" charset="0"/>
+              </a:rPr>
+              <a:t>.</a:t>
+            </a:r>
+          </a:p>
+          <a:p>
+            <a:r>
+              <a:rPr lang="en-CH" sz="4000" dirty="0">
+                <a:latin typeface="Arial" panose="020B0604020202020204" pitchFamily="34" charset="0"/>
+                <a:cs typeface="Arial" panose="020B0604020202020204" pitchFamily="34" charset="0"/>
+              </a:rPr>
+              <a:t>T</a:t>
+            </a:r>
+            <a:r>
+              <a:rPr lang="en-US" sz="4000" dirty="0">
+                <a:latin typeface="Arial" panose="020B0604020202020204" pitchFamily="34" charset="0"/>
+                <a:cs typeface="Arial" panose="020B0604020202020204" pitchFamily="34" charset="0"/>
+              </a:rPr>
+              <a:t>o contextualize this, we review modern </a:t>
+            </a:r>
+            <a:r>
+              <a:rPr lang="en-US" sz="4000" b="1" dirty="0">
+                <a:latin typeface="Arial" panose="020B0604020202020204" pitchFamily="34" charset="0"/>
+                <a:cs typeface="Arial" panose="020B0604020202020204" pitchFamily="34" charset="0"/>
+              </a:rPr>
+              <a:t>detection</a:t>
+            </a:r>
+            <a:r>
+              <a:rPr lang="en-CH" sz="4000" b="1" dirty="0">
+                <a:latin typeface="Arial" panose="020B0604020202020204" pitchFamily="34" charset="0"/>
+                <a:cs typeface="Arial" panose="020B0604020202020204" pitchFamily="34" charset="0"/>
+              </a:rPr>
+              <a:t> </a:t>
+            </a:r>
+            <a:r>
+              <a:rPr lang="en-US" sz="4000" dirty="0">
+                <a:latin typeface="Arial" panose="020B0604020202020204" pitchFamily="34" charset="0"/>
+                <a:cs typeface="Arial" panose="020B0604020202020204" pitchFamily="34" charset="0"/>
+              </a:rPr>
+              <a:t>techniques using deep learning</a:t>
+            </a:r>
+            <a:r>
+              <a:rPr lang="en-CH" sz="4000" dirty="0">
+                <a:latin typeface="Arial" panose="020B0604020202020204" pitchFamily="34" charset="0"/>
+                <a:cs typeface="Arial" panose="020B0604020202020204" pitchFamily="34" charset="0"/>
+              </a:rPr>
+              <a:t> models like </a:t>
+            </a:r>
+            <a:r>
+              <a:rPr lang="en-CH" sz="4000" b="1" dirty="0">
+                <a:latin typeface="Arial" panose="020B0604020202020204" pitchFamily="34" charset="0"/>
+                <a:cs typeface="Arial" panose="020B0604020202020204" pitchFamily="34" charset="0"/>
+              </a:rPr>
+              <a:t>LSTM-ones</a:t>
+            </a:r>
+            <a:r>
+              <a:rPr lang="en-US" sz="4000" dirty="0">
+                <a:latin typeface="Arial" panose="020B0604020202020204" pitchFamily="34" charset="0"/>
+                <a:cs typeface="Arial" panose="020B0604020202020204" pitchFamily="34" charset="0"/>
+              </a:rPr>
+              <a:t> and </a:t>
+            </a:r>
+            <a:r>
+              <a:rPr lang="en-US" sz="4000" b="1" dirty="0">
+                <a:latin typeface="Arial" panose="020B0604020202020204" pitchFamily="34" charset="0"/>
+                <a:cs typeface="Arial" panose="020B0604020202020204" pitchFamily="34" charset="0"/>
+              </a:rPr>
+              <a:t>prevention</a:t>
+            </a:r>
+            <a:r>
+              <a:rPr lang="en-US" sz="4000" dirty="0">
+                <a:latin typeface="Arial" panose="020B0604020202020204" pitchFamily="34" charset="0"/>
+                <a:cs typeface="Arial" panose="020B0604020202020204" pitchFamily="34" charset="0"/>
+              </a:rPr>
+              <a:t> strategies like </a:t>
+            </a:r>
+            <a:r>
+              <a:rPr lang="en-US" sz="4000" b="1" dirty="0">
+                <a:latin typeface="Arial" panose="020B0604020202020204" pitchFamily="34" charset="0"/>
+                <a:cs typeface="Arial" panose="020B0604020202020204" pitchFamily="34" charset="0"/>
+              </a:rPr>
+              <a:t>G-Free</a:t>
+            </a:r>
+            <a:r>
+              <a:rPr lang="en-US" sz="4000" dirty="0">
+                <a:latin typeface="Arial" panose="020B0604020202020204" pitchFamily="34" charset="0"/>
+                <a:cs typeface="Arial" panose="020B0604020202020204" pitchFamily="34" charset="0"/>
+              </a:rPr>
+              <a:t> and </a:t>
+            </a:r>
+            <a:r>
+              <a:rPr lang="en-US" sz="4000" b="1" dirty="0">
+                <a:latin typeface="Arial" panose="020B0604020202020204" pitchFamily="34" charset="0"/>
+                <a:cs typeface="Arial" panose="020B0604020202020204" pitchFamily="34" charset="0"/>
+              </a:rPr>
+              <a:t>EC-CFI</a:t>
+            </a:r>
+            <a:r>
+              <a:rPr lang="en-US" sz="4000" dirty="0">
+                <a:latin typeface="Arial" panose="020B0604020202020204" pitchFamily="34" charset="0"/>
+                <a:cs typeface="Arial" panose="020B0604020202020204" pitchFamily="34" charset="0"/>
+              </a:rPr>
+              <a:t>. </a:t>
+            </a:r>
+            <a:endParaRPr lang="en-CH" sz="4000" dirty="0">
+              <a:latin typeface="Arial" panose="020B0604020202020204" pitchFamily="34" charset="0"/>
+              <a:cs typeface="Arial" panose="020B0604020202020204" pitchFamily="34" charset="0"/>
+            </a:endParaRPr>
+          </a:p>
+        </p:txBody>
+      </p:sp>
+      <p:sp>
+        <p:nvSpPr>
+          <p:cNvPr id="9" name="TextBox 8">
+            <a:extLst>
+              <a:ext uri="{FF2B5EF4-FFF2-40B4-BE49-F238E27FC236}">
+                <a16:creationId xmlns:a16="http://schemas.microsoft.com/office/drawing/2014/main" id="{52A5AA87-8AA3-01AC-9874-C51C8078B6E7}"/>
+              </a:ext>
+            </a:extLst>
+          </p:cNvPr>
+          <p:cNvSpPr txBox="1"/>
+          <p:nvPr/>
+        </p:nvSpPr>
+        <p:spPr>
+          <a:xfrm>
+            <a:off x="1275873" y="12073470"/>
+            <a:ext cx="4265004" cy="707886"/>
+          </a:xfrm>
+          <a:prstGeom prst="rect">
+            <a:avLst/>
+          </a:prstGeom>
+          <a:noFill/>
+        </p:spPr>
+        <p:txBody>
+          <a:bodyPr wrap="square" rtlCol="0">
+            <a:spAutoFit/>
+          </a:bodyPr>
+          <a:lstStyle/>
+          <a:p>
+            <a:r>
+              <a:rPr lang="en-US" sz="4000" b="1" dirty="0">
+                <a:latin typeface="Arial" panose="020B0604020202020204" pitchFamily="34" charset="0"/>
+                <a:cs typeface="Arial" panose="020B0604020202020204" pitchFamily="34" charset="0"/>
+              </a:rPr>
+              <a:t>W</a:t>
+            </a:r>
+            <a:r>
+              <a:rPr lang="en-CH" sz="4000" b="1" dirty="0">
+                <a:latin typeface="Arial" panose="020B0604020202020204" pitchFamily="34" charset="0"/>
+                <a:cs typeface="Arial" panose="020B0604020202020204" pitchFamily="34" charset="0"/>
+              </a:rPr>
+              <a:t>hat is ACE?</a:t>
+            </a:r>
+          </a:p>
+        </p:txBody>
+      </p:sp>
+      <p:sp>
+        <p:nvSpPr>
+          <p:cNvPr id="10" name="TextBox 9">
+            <a:extLst>
+              <a:ext uri="{FF2B5EF4-FFF2-40B4-BE49-F238E27FC236}">
+                <a16:creationId xmlns:a16="http://schemas.microsoft.com/office/drawing/2014/main" id="{B67B456C-7AFD-D21D-6511-A4FBE1E6CEBD}"/>
+              </a:ext>
+            </a:extLst>
+          </p:cNvPr>
+          <p:cNvSpPr txBox="1"/>
+          <p:nvPr/>
+        </p:nvSpPr>
+        <p:spPr>
+          <a:xfrm>
+            <a:off x="1275872" y="20039153"/>
+            <a:ext cx="12021027" cy="2308324"/>
+          </a:xfrm>
+          <a:prstGeom prst="rect">
+            <a:avLst/>
+          </a:prstGeom>
+          <a:noFill/>
+        </p:spPr>
+        <p:txBody>
+          <a:bodyPr wrap="square" rtlCol="0">
+            <a:spAutoFit/>
+          </a:bodyPr>
+          <a:lstStyle/>
+          <a:p>
+            <a:pPr marL="0" marR="0" lvl="0" indent="0" algn="l" defTabSz="457200" rtl="0" eaLnBrk="1" fontAlgn="auto" latinLnBrk="0" hangingPunct="1">
+              <a:lnSpc>
+                <a:spcPct val="100000"/>
+              </a:lnSpc>
+              <a:spcBef>
+                <a:spcPts val="0"/>
+              </a:spcBef>
+              <a:spcAft>
+                <a:spcPts val="0"/>
+              </a:spcAft>
+              <a:buClrTx/>
+              <a:buSzTx/>
+              <a:buFontTx/>
+              <a:buNone/>
+              <a:tabLst/>
+              <a:defRPr/>
+            </a:pPr>
+            <a:r>
+              <a:rPr kumimoji="0" lang="en-US" sz="3600" b="1" i="0" u="none" strike="noStrike" kern="1200" cap="none" spc="0" normalizeH="0" baseline="0" noProof="0" dirty="0">
+                <a:ln>
+                  <a:noFill/>
+                </a:ln>
+                <a:solidFill>
+                  <a:prstClr val="black"/>
+                </a:solidFill>
+                <a:effectLst/>
+                <a:uLnTx/>
+                <a:uFillTx/>
+                <a:latin typeface="Arial" panose="020B0604020202020204" pitchFamily="34" charset="0"/>
+                <a:ea typeface="+mn-ea"/>
+                <a:cs typeface="Arial" panose="020B0604020202020204" pitchFamily="34" charset="0"/>
+              </a:rPr>
+              <a:t>Arbitrary Code Execution (ACE) </a:t>
+            </a:r>
+            <a:r>
+              <a:rPr kumimoji="0" lang="en-US" sz="3600" i="0" u="none" strike="noStrike" kern="1200" cap="none" spc="0" normalizeH="0" baseline="0" noProof="0" dirty="0">
+                <a:ln>
+                  <a:noFill/>
+                </a:ln>
+                <a:solidFill>
+                  <a:prstClr val="black"/>
+                </a:solidFill>
+                <a:effectLst/>
+                <a:uLnTx/>
+                <a:uFillTx/>
+                <a:latin typeface="Arial" panose="020B0604020202020204" pitchFamily="34" charset="0"/>
+                <a:ea typeface="+mn-ea"/>
+                <a:cs typeface="Arial" panose="020B0604020202020204" pitchFamily="34" charset="0"/>
+              </a:rPr>
+              <a:t>refers to the ability of an attacker to run unintended code by exploiting software vulnerabilities, potentially leading to</a:t>
+            </a:r>
+            <a:r>
+              <a:rPr kumimoji="0" lang="en-US" sz="3600" b="1" i="0" u="none" strike="noStrike" kern="1200" cap="none" spc="0" normalizeH="0" baseline="0" noProof="0" dirty="0">
+                <a:ln>
+                  <a:noFill/>
+                </a:ln>
+                <a:solidFill>
+                  <a:prstClr val="black"/>
+                </a:solidFill>
+                <a:effectLst/>
+                <a:uLnTx/>
+                <a:uFillTx/>
+                <a:latin typeface="Arial" panose="020B0604020202020204" pitchFamily="34" charset="0"/>
+                <a:ea typeface="+mn-ea"/>
+                <a:cs typeface="Arial" panose="020B0604020202020204" pitchFamily="34" charset="0"/>
+              </a:rPr>
+              <a:t> data leaks</a:t>
+            </a:r>
+            <a:r>
+              <a:rPr kumimoji="0" lang="en-US" sz="3600" i="0" u="none" strike="noStrike" kern="1200" cap="none" spc="0" normalizeH="0" baseline="0" noProof="0" dirty="0">
+                <a:ln>
+                  <a:noFill/>
+                </a:ln>
+                <a:solidFill>
+                  <a:prstClr val="black"/>
+                </a:solidFill>
+                <a:effectLst/>
+                <a:uLnTx/>
+                <a:uFillTx/>
+                <a:latin typeface="Arial" panose="020B0604020202020204" pitchFamily="34" charset="0"/>
+                <a:ea typeface="+mn-ea"/>
+                <a:cs typeface="Arial" panose="020B0604020202020204" pitchFamily="34" charset="0"/>
+              </a:rPr>
+              <a:t>,</a:t>
+            </a:r>
+            <a:r>
+              <a:rPr kumimoji="0" lang="en-US" sz="3600" b="1" i="0" u="none" strike="noStrike" kern="1200" cap="none" spc="0" normalizeH="0" baseline="0" noProof="0" dirty="0">
+                <a:ln>
+                  <a:noFill/>
+                </a:ln>
+                <a:solidFill>
+                  <a:prstClr val="black"/>
+                </a:solidFill>
+                <a:effectLst/>
+                <a:uLnTx/>
+                <a:uFillTx/>
+                <a:latin typeface="Arial" panose="020B0604020202020204" pitchFamily="34" charset="0"/>
+                <a:ea typeface="+mn-ea"/>
+                <a:cs typeface="Arial" panose="020B0604020202020204" pitchFamily="34" charset="0"/>
+              </a:rPr>
+              <a:t> privilege escalation</a:t>
+            </a:r>
+            <a:r>
+              <a:rPr kumimoji="0" lang="en-US" sz="3600" i="0" u="none" strike="noStrike" kern="1200" cap="none" spc="0" normalizeH="0" baseline="0" noProof="0" dirty="0">
+                <a:ln>
+                  <a:noFill/>
+                </a:ln>
+                <a:solidFill>
+                  <a:prstClr val="black"/>
+                </a:solidFill>
+                <a:effectLst/>
+                <a:uLnTx/>
+                <a:uFillTx/>
+                <a:latin typeface="Arial" panose="020B0604020202020204" pitchFamily="34" charset="0"/>
+                <a:ea typeface="+mn-ea"/>
+                <a:cs typeface="Arial" panose="020B0604020202020204" pitchFamily="34" charset="0"/>
+              </a:rPr>
+              <a:t>, or </a:t>
+            </a:r>
+            <a:r>
+              <a:rPr kumimoji="0" lang="en-US" sz="3600" b="1" i="0" u="none" strike="noStrike" kern="1200" cap="none" spc="0" normalizeH="0" baseline="0" noProof="0" dirty="0">
+                <a:ln>
+                  <a:noFill/>
+                </a:ln>
+                <a:solidFill>
+                  <a:prstClr val="black"/>
+                </a:solidFill>
+                <a:effectLst/>
+                <a:uLnTx/>
+                <a:uFillTx/>
+                <a:latin typeface="Arial" panose="020B0604020202020204" pitchFamily="34" charset="0"/>
+                <a:ea typeface="+mn-ea"/>
+                <a:cs typeface="Arial" panose="020B0604020202020204" pitchFamily="34" charset="0"/>
+              </a:rPr>
+              <a:t>full system compromise</a:t>
+            </a:r>
+            <a:endParaRPr lang="en-CH" sz="1600" dirty="0"/>
+          </a:p>
+        </p:txBody>
+      </p:sp>
+      <p:sp>
+        <p:nvSpPr>
+          <p:cNvPr id="21" name="TextBox 20">
+            <a:extLst>
+              <a:ext uri="{FF2B5EF4-FFF2-40B4-BE49-F238E27FC236}">
+                <a16:creationId xmlns:a16="http://schemas.microsoft.com/office/drawing/2014/main" id="{AD03523E-968C-7C67-CF11-9344BDD044D4}"/>
+              </a:ext>
+            </a:extLst>
+          </p:cNvPr>
+          <p:cNvSpPr txBox="1"/>
+          <p:nvPr/>
+        </p:nvSpPr>
+        <p:spPr>
+          <a:xfrm>
+            <a:off x="16304956" y="5103463"/>
+            <a:ext cx="11650673" cy="707886"/>
+          </a:xfrm>
+          <a:prstGeom prst="rect">
+            <a:avLst/>
+          </a:prstGeom>
+          <a:noFill/>
+        </p:spPr>
+        <p:txBody>
+          <a:bodyPr wrap="square" rtlCol="0">
+            <a:spAutoFit/>
+          </a:bodyPr>
+          <a:lstStyle/>
+          <a:p>
+            <a:r>
+              <a:rPr lang="en-US" sz="4000" b="1" dirty="0">
+                <a:latin typeface="Arial" panose="020B0604020202020204" pitchFamily="34" charset="0"/>
+                <a:cs typeface="Arial" panose="020B0604020202020204" pitchFamily="34" charset="0"/>
+              </a:rPr>
+              <a:t>H</a:t>
+            </a:r>
+            <a:r>
+              <a:rPr lang="en-CH" sz="4000" b="1" dirty="0">
+                <a:latin typeface="Arial" panose="020B0604020202020204" pitchFamily="34" charset="0"/>
+                <a:cs typeface="Arial" panose="020B0604020202020204" pitchFamily="34" charset="0"/>
+              </a:rPr>
+              <a:t>ow does ACE happen in </a:t>
+            </a:r>
+            <a:r>
+              <a:rPr lang="en-US" sz="4000" b="1" i="1" dirty="0">
+                <a:latin typeface="Arial" panose="020B0604020202020204" pitchFamily="34" charset="0"/>
+                <a:cs typeface="Arial" panose="020B0604020202020204" pitchFamily="34" charset="0"/>
+              </a:rPr>
+              <a:t>Pokémon Emerald</a:t>
+            </a:r>
+            <a:r>
+              <a:rPr lang="en-CH" sz="4000" b="1" i="1" dirty="0">
+                <a:latin typeface="Arial" panose="020B0604020202020204" pitchFamily="34" charset="0"/>
+                <a:cs typeface="Arial" panose="020B0604020202020204" pitchFamily="34" charset="0"/>
+              </a:rPr>
+              <a:t>?</a:t>
+            </a:r>
+            <a:endParaRPr lang="en-CH" sz="4000" b="1" dirty="0">
+              <a:latin typeface="Arial" panose="020B0604020202020204" pitchFamily="34" charset="0"/>
+              <a:cs typeface="Arial" panose="020B0604020202020204" pitchFamily="34" charset="0"/>
+            </a:endParaRPr>
+          </a:p>
+        </p:txBody>
+      </p:sp>
+      <p:sp>
+        <p:nvSpPr>
+          <p:cNvPr id="22" name="TextBox 21">
+            <a:extLst>
+              <a:ext uri="{FF2B5EF4-FFF2-40B4-BE49-F238E27FC236}">
+                <a16:creationId xmlns:a16="http://schemas.microsoft.com/office/drawing/2014/main" id="{439D9A73-6445-5A56-E0E2-B7616506F3D6}"/>
+              </a:ext>
+            </a:extLst>
+          </p:cNvPr>
+          <p:cNvSpPr txBox="1"/>
+          <p:nvPr/>
+        </p:nvSpPr>
+        <p:spPr>
+          <a:xfrm>
+            <a:off x="11649002" y="23132923"/>
+            <a:ext cx="6977206" cy="707886"/>
+          </a:xfrm>
+          <a:prstGeom prst="rect">
+            <a:avLst/>
+          </a:prstGeom>
+          <a:noFill/>
+        </p:spPr>
+        <p:txBody>
+          <a:bodyPr wrap="square" rtlCol="0">
+            <a:spAutoFit/>
+          </a:bodyPr>
+          <a:lstStyle/>
+          <a:p>
+            <a:r>
+              <a:rPr lang="en-US" sz="4000" b="1" dirty="0">
+                <a:latin typeface="Arial" panose="020B0604020202020204" pitchFamily="34" charset="0"/>
+                <a:cs typeface="Arial" panose="020B0604020202020204" pitchFamily="34" charset="0"/>
+              </a:rPr>
+              <a:t>N</a:t>
+            </a:r>
+            <a:r>
+              <a:rPr lang="en-CH" sz="4000" b="1" dirty="0" err="1">
+                <a:latin typeface="Arial" panose="020B0604020202020204" pitchFamily="34" charset="0"/>
+                <a:cs typeface="Arial" panose="020B0604020202020204" pitchFamily="34" charset="0"/>
+              </a:rPr>
+              <a:t>ormal</a:t>
+            </a:r>
+            <a:r>
+              <a:rPr lang="en-CH" sz="4000" b="1" dirty="0">
+                <a:latin typeface="Arial" panose="020B0604020202020204" pitchFamily="34" charset="0"/>
+                <a:cs typeface="Arial" panose="020B0604020202020204" pitchFamily="34" charset="0"/>
+              </a:rPr>
+              <a:t> exploitable setup</a:t>
+            </a:r>
+          </a:p>
+        </p:txBody>
+      </p:sp>
+      <p:sp>
+        <p:nvSpPr>
+          <p:cNvPr id="17" name="TextBox 16">
+            <a:extLst>
+              <a:ext uri="{FF2B5EF4-FFF2-40B4-BE49-F238E27FC236}">
+                <a16:creationId xmlns:a16="http://schemas.microsoft.com/office/drawing/2014/main" id="{6D07B031-8A12-0406-91D2-64E302221FC9}"/>
+              </a:ext>
+            </a:extLst>
+          </p:cNvPr>
+          <p:cNvSpPr txBox="1"/>
+          <p:nvPr/>
+        </p:nvSpPr>
+        <p:spPr>
+          <a:xfrm>
+            <a:off x="16304956" y="17889941"/>
+            <a:ext cx="10524080" cy="4524315"/>
+          </a:xfrm>
+          <a:prstGeom prst="rect">
+            <a:avLst/>
+          </a:prstGeom>
+          <a:noFill/>
+        </p:spPr>
+        <p:txBody>
+          <a:bodyPr wrap="square" rtlCol="0">
+            <a:spAutoFit/>
+          </a:bodyPr>
+          <a:lstStyle/>
+          <a:p>
+            <a:pPr marL="0" marR="0" lvl="0" indent="0" algn="l" defTabSz="457200" rtl="0" eaLnBrk="1" fontAlgn="auto" latinLnBrk="0" hangingPunct="1">
+              <a:lnSpc>
+                <a:spcPct val="100000"/>
+              </a:lnSpc>
+              <a:spcBef>
+                <a:spcPts val="0"/>
+              </a:spcBef>
+              <a:spcAft>
+                <a:spcPts val="0"/>
+              </a:spcAft>
+              <a:buClrTx/>
+              <a:buSzTx/>
+              <a:buFontTx/>
+              <a:buNone/>
+              <a:tabLst/>
+              <a:defRPr/>
+            </a:pPr>
+            <a:r>
+              <a:rPr kumimoji="0" lang="en-CH" sz="3600" i="0" u="none" strike="noStrike" kern="1200" cap="none" spc="0" normalizeH="0" baseline="0" noProof="0" dirty="0">
+                <a:ln>
+                  <a:noFill/>
+                </a:ln>
+                <a:solidFill>
+                  <a:prstClr val="black"/>
+                </a:solidFill>
+                <a:effectLst/>
+                <a:uLnTx/>
+                <a:uFillTx/>
+                <a:latin typeface="Arial" panose="020B0604020202020204" pitchFamily="34" charset="0"/>
+                <a:ea typeface="+mn-ea"/>
+                <a:cs typeface="Arial" panose="020B0604020202020204" pitchFamily="34" charset="0"/>
+              </a:rPr>
+              <a:t>With</a:t>
+            </a:r>
+            <a:r>
+              <a:rPr kumimoji="0" lang="en-US" sz="3600" i="0" u="none" strike="noStrike" kern="1200" cap="none" spc="0" normalizeH="0" baseline="0" noProof="0" dirty="0">
+                <a:ln>
+                  <a:noFill/>
+                </a:ln>
+                <a:solidFill>
+                  <a:prstClr val="black"/>
+                </a:solidFill>
+                <a:effectLst/>
+                <a:uLnTx/>
+                <a:uFillTx/>
+                <a:latin typeface="Arial" panose="020B0604020202020204" pitchFamily="34" charset="0"/>
+                <a:ea typeface="+mn-ea"/>
+                <a:cs typeface="Arial" panose="020B0604020202020204" pitchFamily="34" charset="0"/>
+              </a:rPr>
+              <a:t> </a:t>
+            </a:r>
+            <a:r>
+              <a:rPr kumimoji="0" lang="en-US" sz="3600" b="1" i="0" u="none" strike="noStrike" kern="1200" cap="none" spc="0" normalizeH="0" baseline="0" noProof="0" dirty="0">
+                <a:ln>
+                  <a:noFill/>
+                </a:ln>
+                <a:solidFill>
+                  <a:prstClr val="black"/>
+                </a:solidFill>
+                <a:effectLst/>
+                <a:uLnTx/>
+                <a:uFillTx/>
+                <a:latin typeface="Arial" panose="020B0604020202020204" pitchFamily="34" charset="0"/>
+                <a:ea typeface="+mn-ea"/>
+                <a:cs typeface="Arial" panose="020B0604020202020204" pitchFamily="34" charset="0"/>
+              </a:rPr>
+              <a:t>controlled memory corruption</a:t>
+            </a:r>
+            <a:r>
+              <a:rPr kumimoji="0" lang="en-US" sz="3600" i="0" u="none" strike="noStrike" kern="1200" cap="none" spc="0" normalizeH="0" baseline="0" noProof="0" dirty="0">
+                <a:ln>
+                  <a:noFill/>
+                </a:ln>
+                <a:solidFill>
+                  <a:prstClr val="black"/>
+                </a:solidFill>
+                <a:effectLst/>
+                <a:uLnTx/>
+                <a:uFillTx/>
+                <a:latin typeface="Arial" panose="020B0604020202020204" pitchFamily="34" charset="0"/>
+                <a:ea typeface="+mn-ea"/>
+                <a:cs typeface="Arial" panose="020B0604020202020204" pitchFamily="34" charset="0"/>
+              </a:rPr>
+              <a:t>, a Pokémon’s internal substructures can be reordered. As a result, harmless stats like EVs are </a:t>
+            </a:r>
+            <a:r>
+              <a:rPr kumimoji="0" lang="en-US" sz="3600" b="1" i="0" u="none" strike="noStrike" kern="1200" cap="none" spc="0" normalizeH="0" baseline="0" noProof="0" dirty="0">
+                <a:ln>
+                  <a:noFill/>
+                </a:ln>
+                <a:solidFill>
+                  <a:prstClr val="black"/>
+                </a:solidFill>
+                <a:effectLst/>
+                <a:uLnTx/>
+                <a:uFillTx/>
+                <a:latin typeface="Arial" panose="020B0604020202020204" pitchFamily="34" charset="0"/>
+                <a:ea typeface="+mn-ea"/>
+                <a:cs typeface="Arial" panose="020B0604020202020204" pitchFamily="34" charset="0"/>
+              </a:rPr>
+              <a:t>misinterpreted</a:t>
+            </a:r>
+            <a:r>
+              <a:rPr kumimoji="0" lang="en-US" sz="3600" i="0" u="none" strike="noStrike" kern="1200" cap="none" spc="0" normalizeH="0" baseline="0" noProof="0" dirty="0">
+                <a:ln>
+                  <a:noFill/>
+                </a:ln>
+                <a:solidFill>
+                  <a:prstClr val="black"/>
+                </a:solidFill>
+                <a:effectLst/>
+                <a:uLnTx/>
+                <a:uFillTx/>
+                <a:latin typeface="Arial" panose="020B0604020202020204" pitchFamily="34" charset="0"/>
+                <a:ea typeface="+mn-ea"/>
+                <a:cs typeface="Arial" panose="020B0604020202020204" pitchFamily="34" charset="0"/>
+              </a:rPr>
+              <a:t> as a Species ID</a:t>
+            </a:r>
+            <a:r>
+              <a:rPr kumimoji="0" lang="en-CH" sz="3600" i="0" u="none" strike="noStrike" kern="1200" cap="none" spc="0" normalizeH="0" baseline="0" noProof="0" dirty="0">
+                <a:ln>
+                  <a:noFill/>
+                </a:ln>
+                <a:solidFill>
+                  <a:prstClr val="black"/>
+                </a:solidFill>
+                <a:effectLst/>
+                <a:uLnTx/>
+                <a:uFillTx/>
+                <a:latin typeface="Arial" panose="020B0604020202020204" pitchFamily="34" charset="0"/>
+                <a:ea typeface="+mn-ea"/>
+                <a:cs typeface="Arial" panose="020B0604020202020204" pitchFamily="34" charset="0"/>
+              </a:rPr>
+              <a:t>,</a:t>
+            </a:r>
+            <a:r>
+              <a:rPr kumimoji="0" lang="en-US" sz="3600" i="0" u="none" strike="noStrike" kern="1200" cap="none" spc="0" normalizeH="0" baseline="0" noProof="0" dirty="0">
+                <a:ln>
+                  <a:noFill/>
+                </a:ln>
+                <a:solidFill>
+                  <a:prstClr val="black"/>
+                </a:solidFill>
+                <a:effectLst/>
+                <a:uLnTx/>
+                <a:uFillTx/>
+                <a:latin typeface="Arial" panose="020B0604020202020204" pitchFamily="34" charset="0"/>
+                <a:ea typeface="+mn-ea"/>
+                <a:cs typeface="Arial" panose="020B0604020202020204" pitchFamily="34" charset="0"/>
+              </a:rPr>
+              <a:t> </a:t>
+            </a:r>
+            <a:r>
+              <a:rPr kumimoji="0" lang="en-CH" sz="3600" i="0" u="none" strike="noStrike" kern="1200" cap="none" spc="0" normalizeH="0" baseline="0" noProof="0" dirty="0">
+                <a:ln>
+                  <a:noFill/>
+                </a:ln>
+                <a:solidFill>
+                  <a:prstClr val="black"/>
+                </a:solidFill>
+                <a:effectLst/>
+                <a:uLnTx/>
+                <a:uFillTx/>
+                <a:latin typeface="Arial" panose="020B0604020202020204" pitchFamily="34" charset="0"/>
+                <a:ea typeface="+mn-ea"/>
+                <a:cs typeface="Arial" panose="020B0604020202020204" pitchFamily="34" charset="0"/>
+              </a:rPr>
+              <a:t>and w</a:t>
+            </a:r>
+            <a:r>
+              <a:rPr kumimoji="0" lang="en-US" sz="3600" i="0" u="none" strike="noStrike" kern="1200" cap="none" spc="0" normalizeH="0" baseline="0" noProof="0" dirty="0">
+                <a:ln>
+                  <a:noFill/>
+                </a:ln>
+                <a:solidFill>
+                  <a:prstClr val="black"/>
+                </a:solidFill>
+                <a:effectLst/>
+                <a:uLnTx/>
+                <a:uFillTx/>
+                <a:latin typeface="Arial" panose="020B0604020202020204" pitchFamily="34" charset="0"/>
+                <a:ea typeface="+mn-ea"/>
+                <a:cs typeface="Arial" panose="020B0604020202020204" pitchFamily="34" charset="0"/>
+              </a:rPr>
+              <a:t>hen t</a:t>
+            </a:r>
+            <a:r>
+              <a:rPr kumimoji="0" lang="en-CH" sz="3600" i="0" u="none" strike="noStrike" kern="1200" cap="none" spc="0" normalizeH="0" baseline="0" noProof="0" dirty="0">
+                <a:ln>
+                  <a:noFill/>
+                </a:ln>
+                <a:solidFill>
+                  <a:prstClr val="black"/>
+                </a:solidFill>
+                <a:effectLst/>
+                <a:uLnTx/>
+                <a:uFillTx/>
+                <a:latin typeface="Arial" panose="020B0604020202020204" pitchFamily="34" charset="0"/>
+                <a:ea typeface="+mn-ea"/>
+                <a:cs typeface="Arial" panose="020B0604020202020204" pitchFamily="34" charset="0"/>
+              </a:rPr>
+              <a:t>he game tries to execute something that depends on it, like playing its animation, </a:t>
+            </a:r>
+            <a:r>
+              <a:rPr kumimoji="0" lang="en-CH" sz="3600" b="1" i="0" u="none" strike="noStrike" kern="1200" cap="none" spc="0" normalizeH="0" baseline="0" noProof="0" dirty="0">
+                <a:ln>
+                  <a:noFill/>
+                </a:ln>
+                <a:solidFill>
+                  <a:prstClr val="black"/>
+                </a:solidFill>
+                <a:effectLst/>
+                <a:uLnTx/>
+                <a:uFillTx/>
+                <a:latin typeface="Arial" panose="020B0604020202020204" pitchFamily="34" charset="0"/>
+                <a:ea typeface="+mn-ea"/>
+                <a:cs typeface="Arial" panose="020B0604020202020204" pitchFamily="34" charset="0"/>
+              </a:rPr>
+              <a:t>the game can end up pointing to user-manipulated data</a:t>
+            </a:r>
+            <a:r>
+              <a:rPr kumimoji="0" lang="en-CH" sz="3600" i="0" u="none" strike="noStrike" kern="1200" cap="none" spc="0" normalizeH="0" baseline="0" noProof="0" dirty="0">
+                <a:ln>
+                  <a:noFill/>
+                </a:ln>
+                <a:solidFill>
+                  <a:prstClr val="black"/>
+                </a:solidFill>
+                <a:effectLst/>
+                <a:uLnTx/>
+                <a:uFillTx/>
+                <a:latin typeface="Arial" panose="020B0604020202020204" pitchFamily="34" charset="0"/>
+                <a:ea typeface="+mn-ea"/>
+                <a:cs typeface="Arial" panose="020B0604020202020204" pitchFamily="34" charset="0"/>
+              </a:rPr>
+              <a:t>, resulting in ACE. </a:t>
+            </a:r>
+            <a:endParaRPr lang="en-CH" sz="1600" dirty="0"/>
+          </a:p>
+        </p:txBody>
+      </p:sp>
+      <p:pic>
+        <p:nvPicPr>
+          <p:cNvPr id="25" name="Picture 24" descr="A white rectangular sign with black text&#10;&#10;AI-generated content may be incorrect.">
+            <a:extLst>
+              <a:ext uri="{FF2B5EF4-FFF2-40B4-BE49-F238E27FC236}">
+                <a16:creationId xmlns:a16="http://schemas.microsoft.com/office/drawing/2014/main" id="{EBC064B7-1C58-23E1-DC82-2537F19C77C6}"/>
+              </a:ext>
+            </a:extLst>
+          </p:cNvPr>
+          <p:cNvPicPr>
+            <a:picLocks noChangeAspect="1"/>
+          </p:cNvPicPr>
+          <p:nvPr/>
+        </p:nvPicPr>
+        <p:blipFill>
+          <a:blip r:embed="rId4">
+            <a:extLst>
+              <a:ext uri="{28A0092B-C50C-407E-A947-70E740481C1C}">
+                <a14:useLocalDpi xmlns:a14="http://schemas.microsoft.com/office/drawing/2010/main" val="0"/>
+              </a:ext>
+            </a:extLst>
+          </a:blip>
+          <a:stretch>
+            <a:fillRect/>
+          </a:stretch>
+        </p:blipFill>
+        <p:spPr>
+          <a:xfrm>
+            <a:off x="1124129" y="24361234"/>
+            <a:ext cx="28026951" cy="5234132"/>
+          </a:xfrm>
+          <a:prstGeom prst="rect">
+            <a:avLst/>
+          </a:prstGeom>
+        </p:spPr>
+      </p:pic>
+      <p:pic>
+        <p:nvPicPr>
+          <p:cNvPr id="27" name="Picture 26" descr="A diagram of a system&#10;&#10;AI-generated content may be incorrect.">
+            <a:extLst>
+              <a:ext uri="{FF2B5EF4-FFF2-40B4-BE49-F238E27FC236}">
+                <a16:creationId xmlns:a16="http://schemas.microsoft.com/office/drawing/2014/main" id="{271BF8F9-A595-0911-A4A1-E28B738912A5}"/>
+              </a:ext>
+            </a:extLst>
+          </p:cNvPr>
+          <p:cNvPicPr>
+            <a:picLocks noChangeAspect="1"/>
+          </p:cNvPicPr>
+          <p:nvPr/>
+        </p:nvPicPr>
+        <p:blipFill>
+          <a:blip r:embed="rId5">
+            <a:extLst>
+              <a:ext uri="{28A0092B-C50C-407E-A947-70E740481C1C}">
+                <a14:useLocalDpi xmlns:a14="http://schemas.microsoft.com/office/drawing/2010/main" val="0"/>
+              </a:ext>
+            </a:extLst>
+          </a:blip>
+          <a:stretch>
+            <a:fillRect/>
+          </a:stretch>
+        </p:blipFill>
+        <p:spPr>
+          <a:xfrm>
+            <a:off x="15040262" y="34426754"/>
+            <a:ext cx="14470833" cy="5234131"/>
+          </a:xfrm>
+          <a:prstGeom prst="rect">
+            <a:avLst/>
+          </a:prstGeom>
+        </p:spPr>
+      </p:pic>
+      <p:sp>
+        <p:nvSpPr>
+          <p:cNvPr id="29" name="TextBox 28">
+            <a:extLst>
+              <a:ext uri="{FF2B5EF4-FFF2-40B4-BE49-F238E27FC236}">
+                <a16:creationId xmlns:a16="http://schemas.microsoft.com/office/drawing/2014/main" id="{6DA8B4B2-77FE-502E-7AC1-B6BA845A35E1}"/>
+              </a:ext>
+            </a:extLst>
+          </p:cNvPr>
+          <p:cNvSpPr txBox="1"/>
+          <p:nvPr/>
+        </p:nvSpPr>
+        <p:spPr>
+          <a:xfrm>
+            <a:off x="4077279" y="33054498"/>
+            <a:ext cx="6977206" cy="707886"/>
+          </a:xfrm>
+          <a:prstGeom prst="rect">
+            <a:avLst/>
+          </a:prstGeom>
+          <a:noFill/>
+        </p:spPr>
+        <p:txBody>
+          <a:bodyPr wrap="square" rtlCol="0">
+            <a:spAutoFit/>
+          </a:bodyPr>
+          <a:lstStyle/>
+          <a:p>
+            <a:r>
+              <a:rPr lang="en-US" sz="4000" b="1" dirty="0">
+                <a:latin typeface="Arial" panose="020B0604020202020204" pitchFamily="34" charset="0"/>
+                <a:cs typeface="Arial" panose="020B0604020202020204" pitchFamily="34" charset="0"/>
+              </a:rPr>
+              <a:t>D</a:t>
+            </a:r>
+            <a:r>
+              <a:rPr lang="en-CH" sz="4000" b="1" dirty="0" err="1">
+                <a:latin typeface="Arial" panose="020B0604020202020204" pitchFamily="34" charset="0"/>
+                <a:cs typeface="Arial" panose="020B0604020202020204" pitchFamily="34" charset="0"/>
+              </a:rPr>
+              <a:t>etection</a:t>
+            </a:r>
+            <a:r>
+              <a:rPr lang="en-CH" sz="4000" b="1" dirty="0">
+                <a:latin typeface="Arial" panose="020B0604020202020204" pitchFamily="34" charset="0"/>
+                <a:cs typeface="Arial" panose="020B0604020202020204" pitchFamily="34" charset="0"/>
+              </a:rPr>
+              <a:t>-based solution</a:t>
+            </a:r>
+          </a:p>
+        </p:txBody>
+      </p:sp>
+      <p:sp>
+        <p:nvSpPr>
+          <p:cNvPr id="30" name="TextBox 29">
+            <a:extLst>
+              <a:ext uri="{FF2B5EF4-FFF2-40B4-BE49-F238E27FC236}">
+                <a16:creationId xmlns:a16="http://schemas.microsoft.com/office/drawing/2014/main" id="{79913E7B-DCD9-262C-CE91-B7DD4F731E55}"/>
+              </a:ext>
+            </a:extLst>
+          </p:cNvPr>
+          <p:cNvSpPr txBox="1"/>
+          <p:nvPr/>
+        </p:nvSpPr>
+        <p:spPr>
+          <a:xfrm>
+            <a:off x="18078393" y="33054498"/>
+            <a:ext cx="6977206" cy="707886"/>
+          </a:xfrm>
+          <a:prstGeom prst="rect">
+            <a:avLst/>
+          </a:prstGeom>
+          <a:noFill/>
+        </p:spPr>
+        <p:txBody>
+          <a:bodyPr wrap="square" rtlCol="0">
+            <a:spAutoFit/>
+          </a:bodyPr>
+          <a:lstStyle/>
+          <a:p>
+            <a:r>
+              <a:rPr lang="en-US" sz="4000" b="1" dirty="0">
+                <a:latin typeface="Arial" panose="020B0604020202020204" pitchFamily="34" charset="0"/>
+                <a:cs typeface="Arial" panose="020B0604020202020204" pitchFamily="34" charset="0"/>
+              </a:rPr>
+              <a:t>P</a:t>
+            </a:r>
+            <a:r>
+              <a:rPr lang="en-CH" sz="4000" b="1" dirty="0" err="1">
+                <a:latin typeface="Arial" panose="020B0604020202020204" pitchFamily="34" charset="0"/>
+                <a:cs typeface="Arial" panose="020B0604020202020204" pitchFamily="34" charset="0"/>
+              </a:rPr>
+              <a:t>revention</a:t>
+            </a:r>
+            <a:r>
+              <a:rPr lang="en-CH" sz="4000" b="1" dirty="0">
+                <a:latin typeface="Arial" panose="020B0604020202020204" pitchFamily="34" charset="0"/>
+                <a:cs typeface="Arial" panose="020B0604020202020204" pitchFamily="34" charset="0"/>
+              </a:rPr>
+              <a:t>-based solution</a:t>
+            </a:r>
+          </a:p>
+        </p:txBody>
+      </p:sp>
+      <p:pic>
+        <p:nvPicPr>
+          <p:cNvPr id="32" name="Picture 31" descr="A red x on a black background&#10;&#10;AI-generated content may be incorrect.">
+            <a:extLst>
+              <a:ext uri="{FF2B5EF4-FFF2-40B4-BE49-F238E27FC236}">
+                <a16:creationId xmlns:a16="http://schemas.microsoft.com/office/drawing/2014/main" id="{15ACCA31-72E5-AA07-51B5-0F50382BACC0}"/>
+              </a:ext>
+            </a:extLst>
+          </p:cNvPr>
+          <p:cNvPicPr>
+            <a:picLocks noChangeAspect="1"/>
+          </p:cNvPicPr>
+          <p:nvPr/>
+        </p:nvPicPr>
+        <p:blipFill>
+          <a:blip r:embed="rId6">
+            <a:extLst>
+              <a:ext uri="{28A0092B-C50C-407E-A947-70E740481C1C}">
+                <a14:useLocalDpi xmlns:a14="http://schemas.microsoft.com/office/drawing/2010/main" val="0"/>
+              </a:ext>
+            </a:extLst>
+          </a:blip>
+          <a:stretch>
+            <a:fillRect/>
+          </a:stretch>
+        </p:blipFill>
+        <p:spPr>
+          <a:xfrm>
+            <a:off x="1013873" y="34426753"/>
+            <a:ext cx="12576125" cy="5234131"/>
+          </a:xfrm>
+          <a:prstGeom prst="rect">
+            <a:avLst/>
+          </a:prstGeom>
+        </p:spPr>
+      </p:pic>
+      <p:sp>
+        <p:nvSpPr>
+          <p:cNvPr id="33" name="TextBox 32">
+            <a:extLst>
+              <a:ext uri="{FF2B5EF4-FFF2-40B4-BE49-F238E27FC236}">
+                <a16:creationId xmlns:a16="http://schemas.microsoft.com/office/drawing/2014/main" id="{702D7CC4-4ADB-CB02-1B67-92E315A809C1}"/>
+              </a:ext>
+            </a:extLst>
+          </p:cNvPr>
+          <p:cNvSpPr txBox="1"/>
+          <p:nvPr/>
+        </p:nvSpPr>
+        <p:spPr>
+          <a:xfrm>
+            <a:off x="2010668" y="40143488"/>
+            <a:ext cx="10067032" cy="1754326"/>
+          </a:xfrm>
+          <a:prstGeom prst="rect">
+            <a:avLst/>
+          </a:prstGeom>
+          <a:noFill/>
+        </p:spPr>
+        <p:txBody>
+          <a:bodyPr wrap="square" rtlCol="0">
+            <a:spAutoFit/>
+          </a:bodyPr>
+          <a:lstStyle/>
+          <a:p>
+            <a:pPr algn="ctr"/>
+            <a:r>
+              <a:rPr lang="en-CH" sz="3600" dirty="0">
+                <a:latin typeface="Arial" panose="020B0604020202020204" pitchFamily="34" charset="0"/>
+                <a:cs typeface="Arial" panose="020B0604020202020204" pitchFamily="34" charset="0"/>
+              </a:rPr>
+              <a:t>An LSTM model scans source code to detect patterns of exploitable constructs, helping developers fix vulnerabilities before deployment</a:t>
+            </a:r>
+          </a:p>
+        </p:txBody>
+      </p:sp>
+      <p:sp>
+        <p:nvSpPr>
+          <p:cNvPr id="34" name="TextBox 33">
+            <a:extLst>
+              <a:ext uri="{FF2B5EF4-FFF2-40B4-BE49-F238E27FC236}">
+                <a16:creationId xmlns:a16="http://schemas.microsoft.com/office/drawing/2014/main" id="{D63857B5-1651-BF1C-86F2-59C9B0D295C1}"/>
+              </a:ext>
+            </a:extLst>
+          </p:cNvPr>
+          <p:cNvSpPr txBox="1"/>
+          <p:nvPr/>
+        </p:nvSpPr>
+        <p:spPr>
+          <a:xfrm>
+            <a:off x="16304956" y="40143488"/>
+            <a:ext cx="9638334" cy="1754326"/>
+          </a:xfrm>
+          <a:prstGeom prst="rect">
+            <a:avLst/>
+          </a:prstGeom>
+          <a:noFill/>
+        </p:spPr>
+        <p:txBody>
+          <a:bodyPr wrap="square" rtlCol="0">
+            <a:spAutoFit/>
+          </a:bodyPr>
+          <a:lstStyle/>
+          <a:p>
+            <a:pPr marL="0" marR="0" lvl="0" indent="0" algn="ctr" defTabSz="457200" rtl="0" eaLnBrk="1" fontAlgn="auto" latinLnBrk="0" hangingPunct="1">
+              <a:lnSpc>
+                <a:spcPct val="100000"/>
+              </a:lnSpc>
+              <a:spcBef>
+                <a:spcPts val="0"/>
+              </a:spcBef>
+              <a:spcAft>
+                <a:spcPts val="0"/>
+              </a:spcAft>
+              <a:buClrTx/>
+              <a:buSzTx/>
+              <a:buFontTx/>
+              <a:buNone/>
+              <a:tabLst/>
+              <a:defRPr/>
+            </a:pPr>
+            <a:r>
+              <a:rPr kumimoji="0" lang="en-US" sz="3600" i="0" u="none" strike="noStrike" kern="1200" cap="none" spc="0" normalizeH="0" baseline="0" noProof="0" dirty="0">
+                <a:ln>
+                  <a:noFill/>
+                </a:ln>
+                <a:solidFill>
+                  <a:prstClr val="black"/>
+                </a:solidFill>
+                <a:effectLst/>
+                <a:uLnTx/>
+                <a:uFillTx/>
+                <a:latin typeface="Arial" panose="020B0604020202020204" pitchFamily="34" charset="0"/>
+                <a:ea typeface="+mn-ea"/>
+                <a:cs typeface="Arial" panose="020B0604020202020204" pitchFamily="34" charset="0"/>
+              </a:rPr>
+              <a:t>G-Free and EC-CFI enforce strict control-flow rules at runtime, preventing hijacked execution even if memory is compromised</a:t>
+            </a:r>
+            <a:endParaRPr lang="en-CH" sz="1600" dirty="0"/>
+          </a:p>
+        </p:txBody>
+      </p:sp>
+      <p:sp>
+        <p:nvSpPr>
+          <p:cNvPr id="38" name="TextBox 37">
+            <a:extLst>
+              <a:ext uri="{FF2B5EF4-FFF2-40B4-BE49-F238E27FC236}">
+                <a16:creationId xmlns:a16="http://schemas.microsoft.com/office/drawing/2014/main" id="{E823A178-B277-A8AB-9C41-D83586D5C6D4}"/>
+              </a:ext>
+            </a:extLst>
+          </p:cNvPr>
+          <p:cNvSpPr txBox="1"/>
+          <p:nvPr/>
+        </p:nvSpPr>
+        <p:spPr>
+          <a:xfrm>
+            <a:off x="1279341" y="5103463"/>
+            <a:ext cx="11650673" cy="707886"/>
+          </a:xfrm>
+          <a:prstGeom prst="rect">
+            <a:avLst/>
+          </a:prstGeom>
+          <a:noFill/>
+        </p:spPr>
+        <p:txBody>
+          <a:bodyPr wrap="square" rtlCol="0">
+            <a:spAutoFit/>
+          </a:bodyPr>
+          <a:lstStyle/>
+          <a:p>
+            <a:r>
+              <a:rPr lang="en-US" sz="4000" b="1" dirty="0">
+                <a:latin typeface="Arial" panose="020B0604020202020204" pitchFamily="34" charset="0"/>
+                <a:cs typeface="Arial" panose="020B0604020202020204" pitchFamily="34" charset="0"/>
+              </a:rPr>
+              <a:t>W</a:t>
+            </a:r>
+            <a:r>
+              <a:rPr lang="en-CH" sz="4000" b="1" dirty="0">
+                <a:latin typeface="Arial" panose="020B0604020202020204" pitchFamily="34" charset="0"/>
+                <a:cs typeface="Arial" panose="020B0604020202020204" pitchFamily="34" charset="0"/>
+              </a:rPr>
+              <a:t>hat is this about?</a:t>
+            </a:r>
+          </a:p>
+        </p:txBody>
+      </p:sp>
+      <p:sp>
+        <p:nvSpPr>
+          <p:cNvPr id="45" name="TextBox 44">
+            <a:extLst>
+              <a:ext uri="{FF2B5EF4-FFF2-40B4-BE49-F238E27FC236}">
+                <a16:creationId xmlns:a16="http://schemas.microsoft.com/office/drawing/2014/main" id="{770EB338-42D4-2CF5-BB6F-B84A7A4ABE32}"/>
+              </a:ext>
+            </a:extLst>
+          </p:cNvPr>
+          <p:cNvSpPr txBox="1"/>
+          <p:nvPr/>
+        </p:nvSpPr>
+        <p:spPr>
+          <a:xfrm>
+            <a:off x="1124128" y="30017223"/>
+            <a:ext cx="28026951" cy="1754326"/>
+          </a:xfrm>
+          <a:prstGeom prst="rect">
+            <a:avLst/>
+          </a:prstGeom>
+          <a:noFill/>
+        </p:spPr>
+        <p:txBody>
+          <a:bodyPr wrap="square" rtlCol="0">
+            <a:spAutoFit/>
+          </a:bodyPr>
+          <a:lstStyle/>
+          <a:p>
+            <a:pPr marL="0" marR="0" lvl="0" indent="0" algn="ctr" defTabSz="457200" rtl="0" eaLnBrk="1" fontAlgn="auto" latinLnBrk="0" hangingPunct="1">
+              <a:lnSpc>
+                <a:spcPct val="100000"/>
+              </a:lnSpc>
+              <a:spcBef>
+                <a:spcPts val="0"/>
+              </a:spcBef>
+              <a:spcAft>
+                <a:spcPts val="0"/>
+              </a:spcAft>
+              <a:buClrTx/>
+              <a:buSzTx/>
+              <a:buFontTx/>
+              <a:buNone/>
+              <a:tabLst/>
+              <a:defRPr/>
+            </a:pPr>
+            <a:r>
+              <a:rPr kumimoji="0" lang="en-US" sz="3600" i="0" u="none" strike="noStrike" kern="1200" cap="none" spc="0" normalizeH="0" baseline="0" noProof="0" dirty="0">
+                <a:ln>
+                  <a:noFill/>
+                </a:ln>
+                <a:solidFill>
+                  <a:prstClr val="black"/>
+                </a:solidFill>
+                <a:effectLst/>
+                <a:uLnTx/>
+                <a:uFillTx/>
+                <a:latin typeface="Arial" panose="020B0604020202020204" pitchFamily="34" charset="0"/>
+                <a:ea typeface="+mn-ea"/>
+                <a:cs typeface="Arial" panose="020B0604020202020204" pitchFamily="34" charset="0"/>
+              </a:rPr>
+              <a:t>During development, </a:t>
+            </a:r>
+            <a:r>
+              <a:rPr kumimoji="0" lang="en-US" sz="3600" b="1" i="0" u="none" strike="noStrike" kern="1200" cap="none" spc="0" normalizeH="0" baseline="0" noProof="0" dirty="0">
+                <a:ln>
+                  <a:noFill/>
+                </a:ln>
+                <a:solidFill>
+                  <a:prstClr val="black"/>
+                </a:solidFill>
+                <a:effectLst/>
+                <a:uLnTx/>
+                <a:uFillTx/>
+                <a:latin typeface="Arial" panose="020B0604020202020204" pitchFamily="34" charset="0"/>
+                <a:ea typeface="+mn-ea"/>
+                <a:cs typeface="Arial" panose="020B0604020202020204" pitchFamily="34" charset="0"/>
+              </a:rPr>
+              <a:t>vulnerabilities</a:t>
+            </a:r>
+            <a:r>
+              <a:rPr kumimoji="0" lang="en-US" sz="3600" i="0" u="none" strike="noStrike" kern="1200" cap="none" spc="0" normalizeH="0" baseline="0" noProof="0" dirty="0">
+                <a:ln>
+                  <a:noFill/>
+                </a:ln>
+                <a:solidFill>
+                  <a:prstClr val="black"/>
+                </a:solidFill>
+                <a:effectLst/>
+                <a:uLnTx/>
+                <a:uFillTx/>
+                <a:latin typeface="Arial" panose="020B0604020202020204" pitchFamily="34" charset="0"/>
+                <a:ea typeface="+mn-ea"/>
+                <a:cs typeface="Arial" panose="020B0604020202020204" pitchFamily="34" charset="0"/>
+              </a:rPr>
+              <a:t> may be introduced</a:t>
+            </a:r>
+            <a:r>
+              <a:rPr kumimoji="0" lang="en-CH" sz="3600" i="0" u="none" strike="noStrike" kern="1200" cap="none" spc="0" normalizeH="0" baseline="0" noProof="0" dirty="0">
+                <a:ln>
+                  <a:noFill/>
+                </a:ln>
+                <a:solidFill>
+                  <a:prstClr val="black"/>
+                </a:solidFill>
+                <a:effectLst/>
+                <a:uLnTx/>
+                <a:uFillTx/>
+                <a:latin typeface="Arial" panose="020B0604020202020204" pitchFamily="34" charset="0"/>
+                <a:ea typeface="+mn-ea"/>
+                <a:cs typeface="Arial" panose="020B0604020202020204" pitchFamily="34" charset="0"/>
+              </a:rPr>
+              <a:t> </a:t>
+            </a:r>
+            <a:r>
+              <a:rPr kumimoji="0" lang="en-US" sz="3600" i="0" u="none" strike="noStrike" kern="1200" cap="none" spc="0" normalizeH="0" baseline="0" noProof="0" dirty="0">
+                <a:ln>
+                  <a:noFill/>
+                </a:ln>
+                <a:solidFill>
+                  <a:prstClr val="black"/>
+                </a:solidFill>
+                <a:effectLst/>
+                <a:uLnTx/>
+                <a:uFillTx/>
+                <a:latin typeface="Arial" panose="020B0604020202020204" pitchFamily="34" charset="0"/>
+                <a:ea typeface="+mn-ea"/>
+                <a:cs typeface="Arial" panose="020B0604020202020204" pitchFamily="34" charset="0"/>
+              </a:rPr>
+              <a:t>by developer. These bugs, if left </a:t>
+            </a:r>
+            <a:r>
+              <a:rPr kumimoji="0" lang="en-US" sz="3600" b="1" i="0" u="none" strike="noStrike" kern="1200" cap="none" spc="0" normalizeH="0" baseline="0" noProof="0" dirty="0">
+                <a:ln>
+                  <a:noFill/>
+                </a:ln>
+                <a:solidFill>
+                  <a:prstClr val="black"/>
+                </a:solidFill>
+                <a:effectLst/>
+                <a:uLnTx/>
+                <a:uFillTx/>
+                <a:latin typeface="Arial" panose="020B0604020202020204" pitchFamily="34" charset="0"/>
+                <a:ea typeface="+mn-ea"/>
+                <a:cs typeface="Arial" panose="020B0604020202020204" pitchFamily="34" charset="0"/>
+              </a:rPr>
+              <a:t>undetected</a:t>
+            </a:r>
+            <a:r>
+              <a:rPr kumimoji="0" lang="en-US" sz="3600" i="0" u="none" strike="noStrike" kern="1200" cap="none" spc="0" normalizeH="0" baseline="0" noProof="0" dirty="0">
+                <a:ln>
+                  <a:noFill/>
+                </a:ln>
+                <a:solidFill>
+                  <a:prstClr val="black"/>
+                </a:solidFill>
+                <a:effectLst/>
+                <a:uLnTx/>
+                <a:uFillTx/>
+                <a:latin typeface="Arial" panose="020B0604020202020204" pitchFamily="34" charset="0"/>
+                <a:ea typeface="+mn-ea"/>
+                <a:cs typeface="Arial" panose="020B0604020202020204" pitchFamily="34" charset="0"/>
+              </a:rPr>
+              <a:t>, persist through to runtime. When the program runs, attackers can craft </a:t>
+            </a:r>
+            <a:r>
+              <a:rPr kumimoji="0" lang="en-CH" sz="3600" i="0" u="none" strike="noStrike" kern="1200" cap="none" spc="0" normalizeH="0" baseline="0" noProof="0" dirty="0">
+                <a:ln>
+                  <a:noFill/>
+                </a:ln>
+                <a:solidFill>
+                  <a:prstClr val="black"/>
+                </a:solidFill>
+                <a:effectLst/>
+                <a:uLnTx/>
+                <a:uFillTx/>
+                <a:latin typeface="Arial" panose="020B0604020202020204" pitchFamily="34" charset="0"/>
+                <a:ea typeface="+mn-ea"/>
+                <a:cs typeface="Arial" panose="020B0604020202020204" pitchFamily="34" charset="0"/>
+              </a:rPr>
+              <a:t>and inject </a:t>
+            </a:r>
+            <a:r>
+              <a:rPr kumimoji="0" lang="en-US" sz="3600" i="0" u="none" strike="noStrike" kern="1200" cap="none" spc="0" normalizeH="0" baseline="0" noProof="0" dirty="0">
+                <a:ln>
+                  <a:noFill/>
+                </a:ln>
+                <a:solidFill>
+                  <a:prstClr val="black"/>
+                </a:solidFill>
+                <a:effectLst/>
+                <a:uLnTx/>
+                <a:uFillTx/>
+                <a:latin typeface="Arial" panose="020B0604020202020204" pitchFamily="34" charset="0"/>
+                <a:ea typeface="+mn-ea"/>
+                <a:cs typeface="Arial" panose="020B0604020202020204" pitchFamily="34" charset="0"/>
+              </a:rPr>
+              <a:t>malicious input</a:t>
+            </a:r>
+            <a:r>
+              <a:rPr kumimoji="0" lang="en-CH" sz="3600" i="0" u="none" strike="noStrike" kern="1200" cap="none" spc="0" normalizeH="0" baseline="0" noProof="0" dirty="0">
+                <a:ln>
+                  <a:noFill/>
+                </a:ln>
+                <a:solidFill>
+                  <a:prstClr val="black"/>
+                </a:solidFill>
+                <a:effectLst/>
+                <a:uLnTx/>
+                <a:uFillTx/>
+                <a:latin typeface="Arial" panose="020B0604020202020204" pitchFamily="34" charset="0"/>
+                <a:ea typeface="+mn-ea"/>
+                <a:cs typeface="Arial" panose="020B0604020202020204" pitchFamily="34" charset="0"/>
+              </a:rPr>
+              <a:t>s</a:t>
+            </a:r>
+            <a:r>
+              <a:rPr kumimoji="0" lang="en-US" sz="3600" i="0" u="none" strike="noStrike" kern="1200" cap="none" spc="0" normalizeH="0" baseline="0" noProof="0" dirty="0">
+                <a:ln>
+                  <a:noFill/>
+                </a:ln>
+                <a:solidFill>
+                  <a:prstClr val="black"/>
+                </a:solidFill>
+                <a:effectLst/>
+                <a:uLnTx/>
+                <a:uFillTx/>
+                <a:latin typeface="Arial" panose="020B0604020202020204" pitchFamily="34" charset="0"/>
+                <a:ea typeface="+mn-ea"/>
+                <a:cs typeface="Arial" panose="020B0604020202020204" pitchFamily="34" charset="0"/>
+              </a:rPr>
+              <a:t> that targets these flaws, altering the memory state and hijacking control of the program. Without </a:t>
+            </a:r>
+            <a:r>
+              <a:rPr kumimoji="0" lang="en-US" sz="3600" b="1" i="0" u="none" strike="noStrike" kern="1200" cap="none" spc="0" normalizeH="0" baseline="0" noProof="0" dirty="0">
+                <a:ln>
+                  <a:noFill/>
+                </a:ln>
+                <a:solidFill>
+                  <a:prstClr val="black"/>
+                </a:solidFill>
+                <a:effectLst/>
+                <a:uLnTx/>
+                <a:uFillTx/>
+                <a:latin typeface="Arial" panose="020B0604020202020204" pitchFamily="34" charset="0"/>
+                <a:ea typeface="+mn-ea"/>
+                <a:cs typeface="Arial" panose="020B0604020202020204" pitchFamily="34" charset="0"/>
+              </a:rPr>
+              <a:t>detection</a:t>
+            </a:r>
+            <a:r>
+              <a:rPr kumimoji="0" lang="en-US" sz="3600" i="0" u="none" strike="noStrike" kern="1200" cap="none" spc="0" normalizeH="0" baseline="0" noProof="0" dirty="0">
+                <a:ln>
+                  <a:noFill/>
+                </a:ln>
+                <a:solidFill>
+                  <a:prstClr val="black"/>
+                </a:solidFill>
+                <a:effectLst/>
+                <a:uLnTx/>
+                <a:uFillTx/>
+                <a:latin typeface="Arial" panose="020B0604020202020204" pitchFamily="34" charset="0"/>
+                <a:ea typeface="+mn-ea"/>
+                <a:cs typeface="Arial" panose="020B0604020202020204" pitchFamily="34" charset="0"/>
+              </a:rPr>
+              <a:t> or </a:t>
+            </a:r>
+            <a:r>
+              <a:rPr kumimoji="0" lang="en-US" sz="3600" b="1" i="0" u="none" strike="noStrike" kern="1200" cap="none" spc="0" normalizeH="0" baseline="0" noProof="0" dirty="0">
+                <a:ln>
+                  <a:noFill/>
+                </a:ln>
+                <a:solidFill>
+                  <a:prstClr val="black"/>
+                </a:solidFill>
+                <a:effectLst/>
+                <a:uLnTx/>
+                <a:uFillTx/>
+                <a:latin typeface="Arial" panose="020B0604020202020204" pitchFamily="34" charset="0"/>
+                <a:ea typeface="+mn-ea"/>
+                <a:cs typeface="Arial" panose="020B0604020202020204" pitchFamily="34" charset="0"/>
+              </a:rPr>
+              <a:t>prevention</a:t>
+            </a:r>
+            <a:r>
+              <a:rPr kumimoji="0" lang="en-US" sz="3600" i="0" u="none" strike="noStrike" kern="1200" cap="none" spc="0" normalizeH="0" baseline="0" noProof="0" dirty="0">
+                <a:ln>
+                  <a:noFill/>
+                </a:ln>
+                <a:solidFill>
+                  <a:prstClr val="black"/>
+                </a:solidFill>
+                <a:effectLst/>
+                <a:uLnTx/>
+                <a:uFillTx/>
+                <a:latin typeface="Arial" panose="020B0604020202020204" pitchFamily="34" charset="0"/>
+                <a:ea typeface="+mn-ea"/>
+                <a:cs typeface="Arial" panose="020B0604020202020204" pitchFamily="34" charset="0"/>
+              </a:rPr>
+              <a:t> mechanisms, this path enables </a:t>
+            </a:r>
+            <a:r>
+              <a:rPr kumimoji="0" lang="en-US" sz="3600" b="1" i="0" u="none" strike="noStrike" kern="1200" cap="none" spc="0" normalizeH="0" baseline="0" noProof="0" dirty="0">
+                <a:ln>
+                  <a:noFill/>
+                </a:ln>
+                <a:solidFill>
+                  <a:prstClr val="black"/>
+                </a:solidFill>
+                <a:effectLst/>
+                <a:uLnTx/>
+                <a:uFillTx/>
+                <a:latin typeface="Arial" panose="020B0604020202020204" pitchFamily="34" charset="0"/>
+                <a:ea typeface="+mn-ea"/>
+                <a:cs typeface="Arial" panose="020B0604020202020204" pitchFamily="34" charset="0"/>
+              </a:rPr>
+              <a:t>arbitrary code execution</a:t>
+            </a:r>
+            <a:r>
+              <a:rPr kumimoji="0" lang="en-US" sz="3600" i="0" u="none" strike="noStrike" kern="1200" cap="none" spc="0" normalizeH="0" baseline="0" noProof="0" dirty="0">
+                <a:ln>
+                  <a:noFill/>
+                </a:ln>
+                <a:solidFill>
+                  <a:prstClr val="black"/>
+                </a:solidFill>
+                <a:effectLst/>
+                <a:uLnTx/>
+                <a:uFillTx/>
+                <a:latin typeface="Arial" panose="020B0604020202020204" pitchFamily="34" charset="0"/>
+                <a:ea typeface="+mn-ea"/>
+                <a:cs typeface="Arial" panose="020B0604020202020204" pitchFamily="34" charset="0"/>
+              </a:rPr>
+              <a:t>.</a:t>
+            </a:r>
+            <a:endParaRPr lang="en-CH" sz="1600" dirty="0"/>
           </a:p>
         </p:txBody>
       </p:sp>
@@ -3639,112 +5279,6 @@
     <p:extLst>
       <p:ext uri="{BB962C8B-B14F-4D97-AF65-F5344CB8AC3E}">
         <p14:creationId xmlns:p14="http://schemas.microsoft.com/office/powerpoint/2010/main" val="970983195"/>
-      </p:ext>
-    </p:extLst>
-  </p:cSld>
-  <p:clrMapOvr>
-    <a:masterClrMapping/>
-  </p:clrMapOvr>
-</p:sld>
-</file>
-
-<file path=ppt/slides/slide2.xml><?xml version="1.0" encoding="utf-8"?>
-<p:sld xmlns:a="http://schemas.openxmlformats.org/drawingml/2006/main" xmlns:r="http://schemas.openxmlformats.org/officeDocument/2006/relationships" xmlns:p="http://schemas.openxmlformats.org/presentationml/2006/main">
-  <p:cSld>
-    <p:spTree>
-      <p:nvGrpSpPr>
-        <p:cNvPr id="1" name=""/>
-        <p:cNvGrpSpPr/>
-        <p:nvPr/>
-      </p:nvGrpSpPr>
-      <p:grpSpPr>
-        <a:xfrm>
-          <a:off x="0" y="0"/>
-          <a:ext cx="0" cy="0"/>
-          <a:chOff x="0" y="0"/>
-          <a:chExt cx="0" cy="0"/>
-        </a:xfrm>
-      </p:grpSpPr>
-      <p:sp>
-        <p:nvSpPr>
-          <p:cNvPr id="2" name="Subtitle 1"/>
-          <p:cNvSpPr>
-            <a:spLocks noGrp="1"/>
-          </p:cNvSpPr>
-          <p:nvPr>
-            <p:ph type="subTitle" idx="1"/>
-          </p:nvPr>
-        </p:nvSpPr>
-        <p:spPr/>
-        <p:txBody>
-          <a:bodyPr/>
-          <a:lstStyle/>
-          <a:p>
-            <a:endParaRPr lang="it-CH"/>
-          </a:p>
-        </p:txBody>
-      </p:sp>
-      <p:sp>
-        <p:nvSpPr>
-          <p:cNvPr id="3" name="Text Placeholder 2"/>
-          <p:cNvSpPr>
-            <a:spLocks noGrp="1"/>
-          </p:cNvSpPr>
-          <p:nvPr>
-            <p:ph type="body" idx="13"/>
-          </p:nvPr>
-        </p:nvSpPr>
-        <p:spPr/>
-        <p:txBody>
-          <a:bodyPr/>
-          <a:lstStyle/>
-          <a:p>
-            <a:endParaRPr lang="it-CH"/>
-          </a:p>
-        </p:txBody>
-      </p:sp>
-      <p:sp>
-        <p:nvSpPr>
-          <p:cNvPr id="4" name="Text Placeholder 3"/>
-          <p:cNvSpPr>
-            <a:spLocks noGrp="1"/>
-          </p:cNvSpPr>
-          <p:nvPr>
-            <p:ph type="body" sz="half" idx="2"/>
-          </p:nvPr>
-        </p:nvSpPr>
-        <p:spPr/>
-        <p:txBody>
-          <a:bodyPr/>
-          <a:lstStyle/>
-          <a:p>
-            <a:endParaRPr lang="it-CH"/>
-          </a:p>
-        </p:txBody>
-      </p:sp>
-      <p:sp>
-        <p:nvSpPr>
-          <p:cNvPr id="5" name="Title 4"/>
-          <p:cNvSpPr>
-            <a:spLocks noGrp="1"/>
-          </p:cNvSpPr>
-          <p:nvPr>
-            <p:ph type="title"/>
-          </p:nvPr>
-        </p:nvSpPr>
-        <p:spPr/>
-        <p:txBody>
-          <a:bodyPr/>
-          <a:lstStyle/>
-          <a:p>
-            <a:endParaRPr lang="it-CH"/>
-          </a:p>
-        </p:txBody>
-      </p:sp>
-    </p:spTree>
-    <p:extLst>
-      <p:ext uri="{BB962C8B-B14F-4D97-AF65-F5344CB8AC3E}">
-        <p14:creationId xmlns:p14="http://schemas.microsoft.com/office/powerpoint/2010/main" val="693537100"/>
       </p:ext>
     </p:extLst>
   </p:cSld>

</xml_diff>

<commit_message>
Changed some images and integrated Brites' feedback
</commit_message>
<xml_diff>
--- a/Poster/poster-template-ppt-A0.pptx
+++ b/Poster/poster-template-ppt-A0.pptx
@@ -3829,7 +3829,7 @@
         <p:spPr>
           <a:xfrm>
             <a:off x="1279341" y="6079230"/>
-            <a:ext cx="13858263" cy="4401205"/>
+            <a:ext cx="13858263" cy="3970318"/>
           </a:xfrm>
           <a:prstGeom prst="rect">
             <a:avLst/>
@@ -3843,28 +3843,28 @@
           <a:lstStyle/>
           <a:p>
             <a:r>
-              <a:rPr lang="en-US" sz="4000" dirty="0">
+              <a:rPr lang="en-US" sz="3600" dirty="0">
                 <a:latin typeface="Arial" panose="020B0604020202020204" pitchFamily="34" charset="0"/>
                 <a:cs typeface="Arial" panose="020B0604020202020204" pitchFamily="34" charset="0"/>
               </a:rPr>
               <a:t>This project analyzes a real-world ACE exploit in </a:t>
             </a:r>
             <a:r>
-              <a:rPr lang="en-US" sz="4000" i="1" dirty="0">
+              <a:rPr lang="en-US" sz="3600" i="1" dirty="0">
                 <a:latin typeface="Arial" panose="020B0604020202020204" pitchFamily="34" charset="0"/>
                 <a:cs typeface="Arial" panose="020B0604020202020204" pitchFamily="34" charset="0"/>
               </a:rPr>
               <a:t>Pokémon Emerald</a:t>
             </a:r>
             <a:r>
-              <a:rPr lang="en-US" sz="4000" dirty="0">
+              <a:rPr lang="en-US" sz="3600" dirty="0">
                 <a:latin typeface="Arial" panose="020B0604020202020204" pitchFamily="34" charset="0"/>
                 <a:cs typeface="Arial" panose="020B0604020202020204" pitchFamily="34" charset="0"/>
               </a:rPr>
               <a:t>, where in-game glitches are chained to manipulate memory and execute crafted instructions on original hardware</a:t>
             </a:r>
             <a:r>
-              <a:rPr lang="en-CH" sz="4000" dirty="0">
+              <a:rPr lang="en-CH" sz="3600" dirty="0">
                 <a:latin typeface="Arial" panose="020B0604020202020204" pitchFamily="34" charset="0"/>
                 <a:cs typeface="Arial" panose="020B0604020202020204" pitchFamily="34" charset="0"/>
               </a:rPr>
@@ -3872,105 +3872,111 @@
             </a:r>
           </a:p>
           <a:p>
-            <a:r>
-              <a:rPr lang="en-CH" sz="4000" dirty="0">
+            <a:endParaRPr lang="en-CH" sz="3600" dirty="0">
+              <a:latin typeface="Arial" panose="020B0604020202020204" pitchFamily="34" charset="0"/>
+              <a:cs typeface="Arial" panose="020B0604020202020204" pitchFamily="34" charset="0"/>
+            </a:endParaRPr>
+          </a:p>
+          <a:p>
+            <a:r>
+              <a:rPr lang="en-CH" sz="3600" dirty="0">
                 <a:latin typeface="Arial" panose="020B0604020202020204" pitchFamily="34" charset="0"/>
                 <a:cs typeface="Arial" panose="020B0604020202020204" pitchFamily="34" charset="0"/>
               </a:rPr>
               <a:t>T</a:t>
             </a:r>
             <a:r>
-              <a:rPr lang="en-US" sz="4000" dirty="0">
+              <a:rPr lang="en-US" sz="3600" dirty="0">
                 <a:latin typeface="Arial" panose="020B0604020202020204" pitchFamily="34" charset="0"/>
                 <a:cs typeface="Arial" panose="020B0604020202020204" pitchFamily="34" charset="0"/>
               </a:rPr>
               <a:t>o contextualize this, we review modern </a:t>
             </a:r>
             <a:r>
-              <a:rPr lang="en-US" sz="4000" b="1" dirty="0">
+              <a:rPr lang="en-US" sz="3600" b="1" dirty="0">
                 <a:latin typeface="Arial" panose="020B0604020202020204" pitchFamily="34" charset="0"/>
                 <a:cs typeface="Arial" panose="020B0604020202020204" pitchFamily="34" charset="0"/>
               </a:rPr>
               <a:t>detection</a:t>
             </a:r>
             <a:r>
-              <a:rPr lang="en-CH" sz="4000" b="1" dirty="0">
+              <a:rPr lang="en-CH" sz="3600" b="1" dirty="0">
                 <a:latin typeface="Arial" panose="020B0604020202020204" pitchFamily="34" charset="0"/>
                 <a:cs typeface="Arial" panose="020B0604020202020204" pitchFamily="34" charset="0"/>
               </a:rPr>
               <a:t> </a:t>
             </a:r>
             <a:r>
-              <a:rPr lang="en-US" sz="4000" dirty="0">
+              <a:rPr lang="en-US" sz="3600" dirty="0">
                 <a:latin typeface="Arial" panose="020B0604020202020204" pitchFamily="34" charset="0"/>
                 <a:cs typeface="Arial" panose="020B0604020202020204" pitchFamily="34" charset="0"/>
               </a:rPr>
               <a:t>techniques using deep learning</a:t>
             </a:r>
             <a:r>
-              <a:rPr lang="en-CH" sz="4000" dirty="0">
+              <a:rPr lang="en-CH" sz="3600" dirty="0">
                 <a:latin typeface="Arial" panose="020B0604020202020204" pitchFamily="34" charset="0"/>
                 <a:cs typeface="Arial" panose="020B0604020202020204" pitchFamily="34" charset="0"/>
               </a:rPr>
               <a:t> models like </a:t>
             </a:r>
             <a:r>
-              <a:rPr lang="en-CH" sz="4000" b="1" dirty="0">
+              <a:rPr lang="en-CH" sz="3600" b="1" dirty="0">
                 <a:latin typeface="Arial" panose="020B0604020202020204" pitchFamily="34" charset="0"/>
                 <a:cs typeface="Arial" panose="020B0604020202020204" pitchFamily="34" charset="0"/>
               </a:rPr>
               <a:t>LSTM-ones</a:t>
             </a:r>
             <a:r>
-              <a:rPr lang="en-US" sz="4000" dirty="0">
+              <a:rPr lang="en-US" sz="3600" dirty="0">
                 <a:latin typeface="Arial" panose="020B0604020202020204" pitchFamily="34" charset="0"/>
                 <a:cs typeface="Arial" panose="020B0604020202020204" pitchFamily="34" charset="0"/>
               </a:rPr>
               <a:t> and </a:t>
             </a:r>
             <a:r>
-              <a:rPr lang="en-US" sz="4000" b="1" dirty="0">
+              <a:rPr lang="en-US" sz="3600" b="1" dirty="0">
                 <a:latin typeface="Arial" panose="020B0604020202020204" pitchFamily="34" charset="0"/>
                 <a:cs typeface="Arial" panose="020B0604020202020204" pitchFamily="34" charset="0"/>
               </a:rPr>
               <a:t>prevention</a:t>
             </a:r>
             <a:r>
-              <a:rPr lang="en-US" sz="4000" dirty="0">
+              <a:rPr lang="en-US" sz="3600" dirty="0">
                 <a:latin typeface="Arial" panose="020B0604020202020204" pitchFamily="34" charset="0"/>
                 <a:cs typeface="Arial" panose="020B0604020202020204" pitchFamily="34" charset="0"/>
               </a:rPr>
               <a:t> strategies like </a:t>
             </a:r>
             <a:r>
-              <a:rPr lang="en-US" sz="4000" b="1" dirty="0">
+              <a:rPr lang="en-US" sz="3600" b="1" dirty="0">
                 <a:latin typeface="Arial" panose="020B0604020202020204" pitchFamily="34" charset="0"/>
                 <a:cs typeface="Arial" panose="020B0604020202020204" pitchFamily="34" charset="0"/>
               </a:rPr>
               <a:t>G-Free</a:t>
             </a:r>
             <a:r>
-              <a:rPr lang="en-US" sz="4000" dirty="0">
+              <a:rPr lang="en-US" sz="3600" dirty="0">
                 <a:latin typeface="Arial" panose="020B0604020202020204" pitchFamily="34" charset="0"/>
                 <a:cs typeface="Arial" panose="020B0604020202020204" pitchFamily="34" charset="0"/>
               </a:rPr>
               <a:t> and </a:t>
             </a:r>
             <a:r>
-              <a:rPr lang="en-US" sz="4000" b="1" dirty="0">
+              <a:rPr lang="en-US" sz="3600" b="1" dirty="0">
                 <a:latin typeface="Arial" panose="020B0604020202020204" pitchFamily="34" charset="0"/>
                 <a:cs typeface="Arial" panose="020B0604020202020204" pitchFamily="34" charset="0"/>
               </a:rPr>
               <a:t>EC-CFI</a:t>
             </a:r>
             <a:r>
-              <a:rPr lang="en-US" sz="4000" dirty="0">
+              <a:rPr lang="en-US" sz="3600" dirty="0">
                 <a:latin typeface="Arial" panose="020B0604020202020204" pitchFamily="34" charset="0"/>
                 <a:cs typeface="Arial" panose="020B0604020202020204" pitchFamily="34" charset="0"/>
               </a:rPr>
               <a:t>. </a:t>
             </a:r>
-            <a:endParaRPr lang="en-CH" sz="4000" dirty="0">
+            <a:endParaRPr lang="en-CH" sz="3600" dirty="0">
               <a:latin typeface="Arial" panose="020B0604020202020204" pitchFamily="34" charset="0"/>
               <a:cs typeface="Arial" panose="020B0604020202020204" pitchFamily="34" charset="0"/>
             </a:endParaRPr>
@@ -4185,6 +4191,23 @@
                 <a:cs typeface="Arial" panose="020B0604020202020204" pitchFamily="34" charset="0"/>
               </a:rPr>
               <a:t>full system compromise</a:t>
+            </a:r>
+            <a:r>
+              <a:rPr kumimoji="0" lang="en-CH" sz="3600" b="1" i="0" u="none" strike="noStrike" kern="1200" cap="none" spc="0" normalizeH="0" baseline="0" noProof="0" dirty="0">
+                <a:ln>
+                  <a:noFill/>
+                </a:ln>
+                <a:solidFill>
+                  <a:prstClr val="black"/>
+                </a:solidFill>
+                <a:effectLst/>
+                <a:uLnTx/>
+                <a:uFillTx/>
+                <a:latin typeface="Arial" panose="020B0604020202020204" pitchFamily="34" charset="0"/>
+                <a:ea typeface="+mn-ea"/>
+                <a:cs typeface="Arial" panose="020B0604020202020204" pitchFamily="34" charset="0"/>
+              </a:rPr>
+              <a:t>.</a:t>
             </a:r>
             <a:endParaRPr lang="en-CH" sz="1600" dirty="0"/>
           </a:p>
@@ -4821,7 +4844,7 @@
                 <a:latin typeface="Arial" panose="020B0604020202020204" pitchFamily="34" charset="0"/>
                 <a:cs typeface="Arial" panose="020B0604020202020204" pitchFamily="34" charset="0"/>
               </a:rPr>
-              <a:t>An LSTM model scans source code to detect patterns of exploitable constructs, helping developers fix vulnerabilities before deployment</a:t>
+              <a:t>An LSTM model scans source code to detect patterns of exploitable constructs, helping developers fix vulnerabilities before deployment.</a:t>
             </a:r>
           </a:p>
         </p:txBody>
@@ -4888,6 +4911,23 @@
               </a:rPr>
               <a:t>G-Free and EC-CFI enforce strict control-flow rules at runtime, preventing hijacked execution even if memory is compromised</a:t>
             </a:r>
+            <a:r>
+              <a:rPr kumimoji="0" lang="en-CH" sz="3600" i="0" u="none" strike="noStrike" kern="1200" cap="none" spc="0" normalizeH="0" baseline="0" noProof="0" dirty="0">
+                <a:ln>
+                  <a:noFill/>
+                </a:ln>
+                <a:solidFill>
+                  <a:prstClr val="black"/>
+                </a:solidFill>
+                <a:effectLst/>
+                <a:uLnTx/>
+                <a:uFillTx/>
+                <a:latin typeface="Arial" panose="020B0604020202020204" pitchFamily="34" charset="0"/>
+                <a:ea typeface="+mn-ea"/>
+                <a:cs typeface="Arial" panose="020B0604020202020204" pitchFamily="34" charset="0"/>
+              </a:rPr>
+              <a:t>.</a:t>
+            </a:r>
             <a:endParaRPr lang="en-CH" sz="1600" dirty="0"/>
           </a:p>
         </p:txBody>
@@ -5065,7 +5105,58 @@
                 <a:ea typeface="+mn-ea"/>
                 <a:cs typeface="Arial" panose="020B0604020202020204" pitchFamily="34" charset="0"/>
               </a:rPr>
-              <a:t>by developer. These bugs, if left </a:t>
+              <a:t>by developer</a:t>
+            </a:r>
+            <a:r>
+              <a:rPr kumimoji="0" lang="en-CH" sz="3600" i="0" u="none" strike="noStrike" kern="1200" cap="none" spc="0" normalizeH="0" baseline="0" noProof="0">
+                <a:ln>
+                  <a:noFill/>
+                </a:ln>
+                <a:solidFill>
+                  <a:prstClr val="black"/>
+                </a:solidFill>
+                <a:effectLst/>
+                <a:uLnTx/>
+                <a:uFillTx/>
+                <a:latin typeface="Arial" panose="020B0604020202020204" pitchFamily="34" charset="0"/>
+                <a:ea typeface="+mn-ea"/>
+                <a:cs typeface="Arial" panose="020B0604020202020204" pitchFamily="34" charset="0"/>
+              </a:rPr>
+              <a:t>s</a:t>
+            </a:r>
+            <a:r>
+              <a:rPr kumimoji="0" lang="en-US" sz="3600" i="0" u="none" strike="noStrike" kern="1200" cap="none" spc="0" normalizeH="0" baseline="0" noProof="0">
+                <a:ln>
+                  <a:noFill/>
+                </a:ln>
+                <a:solidFill>
+                  <a:prstClr val="black"/>
+                </a:solidFill>
+                <a:effectLst/>
+                <a:uLnTx/>
+                <a:uFillTx/>
+                <a:latin typeface="Arial" panose="020B0604020202020204" pitchFamily="34" charset="0"/>
+                <a:ea typeface="+mn-ea"/>
+                <a:cs typeface="Arial" panose="020B0604020202020204" pitchFamily="34" charset="0"/>
+              </a:rPr>
+              <a:t>. </a:t>
+            </a:r>
+            <a:r>
+              <a:rPr kumimoji="0" lang="en-US" sz="3600" i="0" u="none" strike="noStrike" kern="1200" cap="none" spc="0" normalizeH="0" baseline="0" noProof="0" dirty="0">
+                <a:ln>
+                  <a:noFill/>
+                </a:ln>
+                <a:solidFill>
+                  <a:prstClr val="black"/>
+                </a:solidFill>
+                <a:effectLst/>
+                <a:uLnTx/>
+                <a:uFillTx/>
+                <a:latin typeface="Arial" panose="020B0604020202020204" pitchFamily="34" charset="0"/>
+                <a:ea typeface="+mn-ea"/>
+                <a:cs typeface="Arial" panose="020B0604020202020204" pitchFamily="34" charset="0"/>
+              </a:rPr>
+              <a:t>These bugs, if left </a:t>
             </a:r>
             <a:r>
               <a:rPr kumimoji="0" lang="en-US" sz="3600" b="1" i="0" u="none" strike="noStrike" kern="1200" cap="none" spc="0" normalizeH="0" baseline="0" noProof="0" dirty="0">

</xml_diff>